<commit_message>
Update Docs: Class Diagram, ppt
</commit_message>
<xml_diff>
--- a/docs/전기프2_쁠쁠밸리_2주차 (1).pptx
+++ b/docs/전기프2_쁠쁠밸리_2주차 (1).pptx
@@ -117,7 +117,18 @@
   </p:defaultTextStyle>
   <p:extLst>
     <p:ext uri="{EFAFB233-063F-42B5-8137-9DF3F51BA10A}">
-      <p15:sldGuideLst xmlns:p15="http://schemas.microsoft.com/office/powerpoint/2012/main" xmlns=""/>
+      <p15:sldGuideLst xmlns:p15="http://schemas.microsoft.com/office/powerpoint/2012/main">
+        <p15:guide id="1" orient="horz" pos="2160">
+          <p15:clr>
+            <a:srgbClr val="A4A3A4"/>
+          </p15:clr>
+        </p15:guide>
+        <p15:guide id="2" pos="3840">
+          <p15:clr>
+            <a:srgbClr val="A4A3A4"/>
+          </p15:clr>
+        </p15:guide>
+      </p15:sldGuideLst>
     </p:ext>
   </p:extLst>
 </p:presentation>
@@ -145,7 +156,7 @@
           <p:cNvPr id="2" name="제목 1">
             <a:extLst>
               <a:ext uri="{FF2B5EF4-FFF2-40B4-BE49-F238E27FC236}">
-                <a16:creationId xmlns:a16="http://schemas.microsoft.com/office/drawing/2014/main" xmlns="" id="{0D792E4B-4F3A-4860-80FE-B880E1EAB1CD}"/>
+                <a16:creationId xmlns:a16="http://schemas.microsoft.com/office/drawing/2014/main" id="{0D792E4B-4F3A-4860-80FE-B880E1EAB1CD}"/>
               </a:ext>
             </a:extLst>
           </p:cNvPr>
@@ -182,7 +193,7 @@
           <p:cNvPr id="3" name="부제목 2">
             <a:extLst>
               <a:ext uri="{FF2B5EF4-FFF2-40B4-BE49-F238E27FC236}">
-                <a16:creationId xmlns:a16="http://schemas.microsoft.com/office/drawing/2014/main" xmlns="" id="{8D5E5F2B-C34C-4692-8DFD-AB6086F26501}"/>
+                <a16:creationId xmlns:a16="http://schemas.microsoft.com/office/drawing/2014/main" id="{8D5E5F2B-C34C-4692-8DFD-AB6086F26501}"/>
               </a:ext>
             </a:extLst>
           </p:cNvPr>
@@ -252,7 +263,7 @@
           <p:cNvPr id="4" name="날짜 개체 틀 3">
             <a:extLst>
               <a:ext uri="{FF2B5EF4-FFF2-40B4-BE49-F238E27FC236}">
-                <a16:creationId xmlns:a16="http://schemas.microsoft.com/office/drawing/2014/main" xmlns="" id="{C50FB5B5-1B4F-4515-834A-94B94BC42810}"/>
+                <a16:creationId xmlns:a16="http://schemas.microsoft.com/office/drawing/2014/main" id="{C50FB5B5-1B4F-4515-834A-94B94BC42810}"/>
               </a:ext>
             </a:extLst>
           </p:cNvPr>
@@ -271,7 +282,7 @@
             <a:fld id="{C835A31B-3310-4D1A-9032-E31AE5C76220}" type="datetimeFigureOut">
               <a:rPr lang="ko-KR" altLang="en-US" smtClean="0"/>
               <a:pPr/>
-              <a:t>2019-05-27</a:t>
+              <a:t>2019-05-28</a:t>
             </a:fld>
             <a:endParaRPr lang="ko-KR" altLang="en-US"/>
           </a:p>
@@ -282,7 +293,7 @@
           <p:cNvPr id="5" name="바닥글 개체 틀 4">
             <a:extLst>
               <a:ext uri="{FF2B5EF4-FFF2-40B4-BE49-F238E27FC236}">
-                <a16:creationId xmlns:a16="http://schemas.microsoft.com/office/drawing/2014/main" xmlns="" id="{E4993169-6E82-4C33-8EFC-A14C49834BAA}"/>
+                <a16:creationId xmlns:a16="http://schemas.microsoft.com/office/drawing/2014/main" id="{E4993169-6E82-4C33-8EFC-A14C49834BAA}"/>
               </a:ext>
             </a:extLst>
           </p:cNvPr>
@@ -307,7 +318,7 @@
           <p:cNvPr id="6" name="슬라이드 번호 개체 틀 5">
             <a:extLst>
               <a:ext uri="{FF2B5EF4-FFF2-40B4-BE49-F238E27FC236}">
-                <a16:creationId xmlns:a16="http://schemas.microsoft.com/office/drawing/2014/main" xmlns="" id="{389C635C-470B-4341-9C4B-7E9284A1AAD6}"/>
+                <a16:creationId xmlns:a16="http://schemas.microsoft.com/office/drawing/2014/main" id="{389C635C-470B-4341-9C4B-7E9284A1AAD6}"/>
               </a:ext>
             </a:extLst>
           </p:cNvPr>
@@ -335,7 +346,7 @@
     </p:spTree>
     <p:extLst>
       <p:ext uri="{BB962C8B-B14F-4D97-AF65-F5344CB8AC3E}">
-        <p14:creationId xmlns:p14="http://schemas.microsoft.com/office/powerpoint/2010/main" xmlns="" val="1146102924"/>
+        <p14:creationId xmlns:p14="http://schemas.microsoft.com/office/powerpoint/2010/main" val="1146102924"/>
       </p:ext>
     </p:extLst>
   </p:cSld>
@@ -367,7 +378,7 @@
           <p:cNvPr id="2" name="제목 1">
             <a:extLst>
               <a:ext uri="{FF2B5EF4-FFF2-40B4-BE49-F238E27FC236}">
-                <a16:creationId xmlns:a16="http://schemas.microsoft.com/office/drawing/2014/main" xmlns="" id="{1BF37D49-FE4A-47B6-9D29-FDDFB9FCA88E}"/>
+                <a16:creationId xmlns:a16="http://schemas.microsoft.com/office/drawing/2014/main" id="{1BF37D49-FE4A-47B6-9D29-FDDFB9FCA88E}"/>
               </a:ext>
             </a:extLst>
           </p:cNvPr>
@@ -395,7 +406,7 @@
           <p:cNvPr id="3" name="세로 텍스트 개체 틀 2">
             <a:extLst>
               <a:ext uri="{FF2B5EF4-FFF2-40B4-BE49-F238E27FC236}">
-                <a16:creationId xmlns:a16="http://schemas.microsoft.com/office/drawing/2014/main" xmlns="" id="{AA1EA473-F6EA-4E90-9C66-193FAFE16DBB}"/>
+                <a16:creationId xmlns:a16="http://schemas.microsoft.com/office/drawing/2014/main" id="{AA1EA473-F6EA-4E90-9C66-193FAFE16DBB}"/>
               </a:ext>
             </a:extLst>
           </p:cNvPr>
@@ -452,7 +463,7 @@
           <p:cNvPr id="4" name="날짜 개체 틀 3">
             <a:extLst>
               <a:ext uri="{FF2B5EF4-FFF2-40B4-BE49-F238E27FC236}">
-                <a16:creationId xmlns:a16="http://schemas.microsoft.com/office/drawing/2014/main" xmlns="" id="{8C5037DA-849A-45BA-A8A3-48FF1CD7E6CB}"/>
+                <a16:creationId xmlns:a16="http://schemas.microsoft.com/office/drawing/2014/main" id="{8C5037DA-849A-45BA-A8A3-48FF1CD7E6CB}"/>
               </a:ext>
             </a:extLst>
           </p:cNvPr>
@@ -471,7 +482,7 @@
             <a:fld id="{C835A31B-3310-4D1A-9032-E31AE5C76220}" type="datetimeFigureOut">
               <a:rPr lang="ko-KR" altLang="en-US" smtClean="0"/>
               <a:pPr/>
-              <a:t>2019-05-27</a:t>
+              <a:t>2019-05-28</a:t>
             </a:fld>
             <a:endParaRPr lang="ko-KR" altLang="en-US"/>
           </a:p>
@@ -482,7 +493,7 @@
           <p:cNvPr id="5" name="바닥글 개체 틀 4">
             <a:extLst>
               <a:ext uri="{FF2B5EF4-FFF2-40B4-BE49-F238E27FC236}">
-                <a16:creationId xmlns:a16="http://schemas.microsoft.com/office/drawing/2014/main" xmlns="" id="{0DB08F3B-29A5-4671-921A-5D6BE23D68E0}"/>
+                <a16:creationId xmlns:a16="http://schemas.microsoft.com/office/drawing/2014/main" id="{0DB08F3B-29A5-4671-921A-5D6BE23D68E0}"/>
               </a:ext>
             </a:extLst>
           </p:cNvPr>
@@ -507,7 +518,7 @@
           <p:cNvPr id="6" name="슬라이드 번호 개체 틀 5">
             <a:extLst>
               <a:ext uri="{FF2B5EF4-FFF2-40B4-BE49-F238E27FC236}">
-                <a16:creationId xmlns:a16="http://schemas.microsoft.com/office/drawing/2014/main" xmlns="" id="{EC648485-7ED1-4C22-919B-DE148E9B51D3}"/>
+                <a16:creationId xmlns:a16="http://schemas.microsoft.com/office/drawing/2014/main" id="{EC648485-7ED1-4C22-919B-DE148E9B51D3}"/>
               </a:ext>
             </a:extLst>
           </p:cNvPr>
@@ -535,7 +546,7 @@
     </p:spTree>
     <p:extLst>
       <p:ext uri="{BB962C8B-B14F-4D97-AF65-F5344CB8AC3E}">
-        <p14:creationId xmlns:p14="http://schemas.microsoft.com/office/powerpoint/2010/main" xmlns="" val="173176876"/>
+        <p14:creationId xmlns:p14="http://schemas.microsoft.com/office/powerpoint/2010/main" val="173176876"/>
       </p:ext>
     </p:extLst>
   </p:cSld>
@@ -567,7 +578,7 @@
           <p:cNvPr id="2" name="세로 제목 1">
             <a:extLst>
               <a:ext uri="{FF2B5EF4-FFF2-40B4-BE49-F238E27FC236}">
-                <a16:creationId xmlns:a16="http://schemas.microsoft.com/office/drawing/2014/main" xmlns="" id="{6012A610-7858-4B4D-A99C-9372A1714F2F}"/>
+                <a16:creationId xmlns:a16="http://schemas.microsoft.com/office/drawing/2014/main" id="{6012A610-7858-4B4D-A99C-9372A1714F2F}"/>
               </a:ext>
             </a:extLst>
           </p:cNvPr>
@@ -600,7 +611,7 @@
           <p:cNvPr id="3" name="세로 텍스트 개체 틀 2">
             <a:extLst>
               <a:ext uri="{FF2B5EF4-FFF2-40B4-BE49-F238E27FC236}">
-                <a16:creationId xmlns:a16="http://schemas.microsoft.com/office/drawing/2014/main" xmlns="" id="{18E37D83-0A58-4085-94E4-BAC26C857206}"/>
+                <a16:creationId xmlns:a16="http://schemas.microsoft.com/office/drawing/2014/main" id="{18E37D83-0A58-4085-94E4-BAC26C857206}"/>
               </a:ext>
             </a:extLst>
           </p:cNvPr>
@@ -662,7 +673,7 @@
           <p:cNvPr id="4" name="날짜 개체 틀 3">
             <a:extLst>
               <a:ext uri="{FF2B5EF4-FFF2-40B4-BE49-F238E27FC236}">
-                <a16:creationId xmlns:a16="http://schemas.microsoft.com/office/drawing/2014/main" xmlns="" id="{84488466-B271-457C-8C95-1A1FA5F87364}"/>
+                <a16:creationId xmlns:a16="http://schemas.microsoft.com/office/drawing/2014/main" id="{84488466-B271-457C-8C95-1A1FA5F87364}"/>
               </a:ext>
             </a:extLst>
           </p:cNvPr>
@@ -681,7 +692,7 @@
             <a:fld id="{C835A31B-3310-4D1A-9032-E31AE5C76220}" type="datetimeFigureOut">
               <a:rPr lang="ko-KR" altLang="en-US" smtClean="0"/>
               <a:pPr/>
-              <a:t>2019-05-27</a:t>
+              <a:t>2019-05-28</a:t>
             </a:fld>
             <a:endParaRPr lang="ko-KR" altLang="en-US"/>
           </a:p>
@@ -692,7 +703,7 @@
           <p:cNvPr id="5" name="바닥글 개체 틀 4">
             <a:extLst>
               <a:ext uri="{FF2B5EF4-FFF2-40B4-BE49-F238E27FC236}">
-                <a16:creationId xmlns:a16="http://schemas.microsoft.com/office/drawing/2014/main" xmlns="" id="{E6764F10-5E1F-41ED-B72E-ED486C999A57}"/>
+                <a16:creationId xmlns:a16="http://schemas.microsoft.com/office/drawing/2014/main" id="{E6764F10-5E1F-41ED-B72E-ED486C999A57}"/>
               </a:ext>
             </a:extLst>
           </p:cNvPr>
@@ -717,7 +728,7 @@
           <p:cNvPr id="6" name="슬라이드 번호 개체 틀 5">
             <a:extLst>
               <a:ext uri="{FF2B5EF4-FFF2-40B4-BE49-F238E27FC236}">
-                <a16:creationId xmlns:a16="http://schemas.microsoft.com/office/drawing/2014/main" xmlns="" id="{38327DDF-8255-49B5-949B-3670CB3B3A09}"/>
+                <a16:creationId xmlns:a16="http://schemas.microsoft.com/office/drawing/2014/main" id="{38327DDF-8255-49B5-949B-3670CB3B3A09}"/>
               </a:ext>
             </a:extLst>
           </p:cNvPr>
@@ -745,7 +756,7 @@
     </p:spTree>
     <p:extLst>
       <p:ext uri="{BB962C8B-B14F-4D97-AF65-F5344CB8AC3E}">
-        <p14:creationId xmlns:p14="http://schemas.microsoft.com/office/powerpoint/2010/main" xmlns="" val="1215312489"/>
+        <p14:creationId xmlns:p14="http://schemas.microsoft.com/office/powerpoint/2010/main" val="1215312489"/>
       </p:ext>
     </p:extLst>
   </p:cSld>
@@ -777,7 +788,7 @@
           <p:cNvPr id="2" name="제목 1">
             <a:extLst>
               <a:ext uri="{FF2B5EF4-FFF2-40B4-BE49-F238E27FC236}">
-                <a16:creationId xmlns:a16="http://schemas.microsoft.com/office/drawing/2014/main" xmlns="" id="{33A41242-9072-4B60-B5E9-52F7E57CE665}"/>
+                <a16:creationId xmlns:a16="http://schemas.microsoft.com/office/drawing/2014/main" id="{33A41242-9072-4B60-B5E9-52F7E57CE665}"/>
               </a:ext>
             </a:extLst>
           </p:cNvPr>
@@ -805,7 +816,7 @@
           <p:cNvPr id="3" name="내용 개체 틀 2">
             <a:extLst>
               <a:ext uri="{FF2B5EF4-FFF2-40B4-BE49-F238E27FC236}">
-                <a16:creationId xmlns:a16="http://schemas.microsoft.com/office/drawing/2014/main" xmlns="" id="{7ADB1C6C-0D3F-4298-AEE5-41F4BF7731A5}"/>
+                <a16:creationId xmlns:a16="http://schemas.microsoft.com/office/drawing/2014/main" id="{7ADB1C6C-0D3F-4298-AEE5-41F4BF7731A5}"/>
               </a:ext>
             </a:extLst>
           </p:cNvPr>
@@ -862,7 +873,7 @@
           <p:cNvPr id="4" name="날짜 개체 틀 3">
             <a:extLst>
               <a:ext uri="{FF2B5EF4-FFF2-40B4-BE49-F238E27FC236}">
-                <a16:creationId xmlns:a16="http://schemas.microsoft.com/office/drawing/2014/main" xmlns="" id="{89FFEEF2-7338-4DCA-8116-5077ADAAA397}"/>
+                <a16:creationId xmlns:a16="http://schemas.microsoft.com/office/drawing/2014/main" id="{89FFEEF2-7338-4DCA-8116-5077ADAAA397}"/>
               </a:ext>
             </a:extLst>
           </p:cNvPr>
@@ -881,7 +892,7 @@
             <a:fld id="{C835A31B-3310-4D1A-9032-E31AE5C76220}" type="datetimeFigureOut">
               <a:rPr lang="ko-KR" altLang="en-US" smtClean="0"/>
               <a:pPr/>
-              <a:t>2019-05-27</a:t>
+              <a:t>2019-05-28</a:t>
             </a:fld>
             <a:endParaRPr lang="ko-KR" altLang="en-US"/>
           </a:p>
@@ -892,7 +903,7 @@
           <p:cNvPr id="5" name="바닥글 개체 틀 4">
             <a:extLst>
               <a:ext uri="{FF2B5EF4-FFF2-40B4-BE49-F238E27FC236}">
-                <a16:creationId xmlns:a16="http://schemas.microsoft.com/office/drawing/2014/main" xmlns="" id="{BAF7AF95-6B41-4292-8FAE-1E27FA9DF0E4}"/>
+                <a16:creationId xmlns:a16="http://schemas.microsoft.com/office/drawing/2014/main" id="{BAF7AF95-6B41-4292-8FAE-1E27FA9DF0E4}"/>
               </a:ext>
             </a:extLst>
           </p:cNvPr>
@@ -917,7 +928,7 @@
           <p:cNvPr id="6" name="슬라이드 번호 개체 틀 5">
             <a:extLst>
               <a:ext uri="{FF2B5EF4-FFF2-40B4-BE49-F238E27FC236}">
-                <a16:creationId xmlns:a16="http://schemas.microsoft.com/office/drawing/2014/main" xmlns="" id="{58DC642D-366E-4906-978A-EE94DDB509F3}"/>
+                <a16:creationId xmlns:a16="http://schemas.microsoft.com/office/drawing/2014/main" id="{58DC642D-366E-4906-978A-EE94DDB509F3}"/>
               </a:ext>
             </a:extLst>
           </p:cNvPr>
@@ -945,7 +956,7 @@
     </p:spTree>
     <p:extLst>
       <p:ext uri="{BB962C8B-B14F-4D97-AF65-F5344CB8AC3E}">
-        <p14:creationId xmlns:p14="http://schemas.microsoft.com/office/powerpoint/2010/main" xmlns="" val="2891433147"/>
+        <p14:creationId xmlns:p14="http://schemas.microsoft.com/office/powerpoint/2010/main" val="2891433147"/>
       </p:ext>
     </p:extLst>
   </p:cSld>
@@ -977,7 +988,7 @@
           <p:cNvPr id="2" name="제목 1">
             <a:extLst>
               <a:ext uri="{FF2B5EF4-FFF2-40B4-BE49-F238E27FC236}">
-                <a16:creationId xmlns:a16="http://schemas.microsoft.com/office/drawing/2014/main" xmlns="" id="{85106112-E145-4705-B5A0-68EF01D24DBB}"/>
+                <a16:creationId xmlns:a16="http://schemas.microsoft.com/office/drawing/2014/main" id="{85106112-E145-4705-B5A0-68EF01D24DBB}"/>
               </a:ext>
             </a:extLst>
           </p:cNvPr>
@@ -1014,7 +1025,7 @@
           <p:cNvPr id="3" name="텍스트 개체 틀 2">
             <a:extLst>
               <a:ext uri="{FF2B5EF4-FFF2-40B4-BE49-F238E27FC236}">
-                <a16:creationId xmlns:a16="http://schemas.microsoft.com/office/drawing/2014/main" xmlns="" id="{22025E1F-BB06-489C-8ED0-DFC34C970DA2}"/>
+                <a16:creationId xmlns:a16="http://schemas.microsoft.com/office/drawing/2014/main" id="{22025E1F-BB06-489C-8ED0-DFC34C970DA2}"/>
               </a:ext>
             </a:extLst>
           </p:cNvPr>
@@ -1139,7 +1150,7 @@
           <p:cNvPr id="4" name="날짜 개체 틀 3">
             <a:extLst>
               <a:ext uri="{FF2B5EF4-FFF2-40B4-BE49-F238E27FC236}">
-                <a16:creationId xmlns:a16="http://schemas.microsoft.com/office/drawing/2014/main" xmlns="" id="{F01906D4-C76A-4797-8EA1-83ABFA38A786}"/>
+                <a16:creationId xmlns:a16="http://schemas.microsoft.com/office/drawing/2014/main" id="{F01906D4-C76A-4797-8EA1-83ABFA38A786}"/>
               </a:ext>
             </a:extLst>
           </p:cNvPr>
@@ -1158,7 +1169,7 @@
             <a:fld id="{C835A31B-3310-4D1A-9032-E31AE5C76220}" type="datetimeFigureOut">
               <a:rPr lang="ko-KR" altLang="en-US" smtClean="0"/>
               <a:pPr/>
-              <a:t>2019-05-27</a:t>
+              <a:t>2019-05-28</a:t>
             </a:fld>
             <a:endParaRPr lang="ko-KR" altLang="en-US"/>
           </a:p>
@@ -1169,7 +1180,7 @@
           <p:cNvPr id="5" name="바닥글 개체 틀 4">
             <a:extLst>
               <a:ext uri="{FF2B5EF4-FFF2-40B4-BE49-F238E27FC236}">
-                <a16:creationId xmlns:a16="http://schemas.microsoft.com/office/drawing/2014/main" xmlns="" id="{0B26C029-7F86-4CBA-8572-2761ACCEB9B2}"/>
+                <a16:creationId xmlns:a16="http://schemas.microsoft.com/office/drawing/2014/main" id="{0B26C029-7F86-4CBA-8572-2761ACCEB9B2}"/>
               </a:ext>
             </a:extLst>
           </p:cNvPr>
@@ -1194,7 +1205,7 @@
           <p:cNvPr id="6" name="슬라이드 번호 개체 틀 5">
             <a:extLst>
               <a:ext uri="{FF2B5EF4-FFF2-40B4-BE49-F238E27FC236}">
-                <a16:creationId xmlns:a16="http://schemas.microsoft.com/office/drawing/2014/main" xmlns="" id="{52C7CBDD-0E8F-4CF6-8365-33634D029C4A}"/>
+                <a16:creationId xmlns:a16="http://schemas.microsoft.com/office/drawing/2014/main" id="{52C7CBDD-0E8F-4CF6-8365-33634D029C4A}"/>
               </a:ext>
             </a:extLst>
           </p:cNvPr>
@@ -1222,7 +1233,7 @@
     </p:spTree>
     <p:extLst>
       <p:ext uri="{BB962C8B-B14F-4D97-AF65-F5344CB8AC3E}">
-        <p14:creationId xmlns:p14="http://schemas.microsoft.com/office/powerpoint/2010/main" xmlns="" val="1462476672"/>
+        <p14:creationId xmlns:p14="http://schemas.microsoft.com/office/powerpoint/2010/main" val="1462476672"/>
       </p:ext>
     </p:extLst>
   </p:cSld>
@@ -1254,7 +1265,7 @@
           <p:cNvPr id="2" name="제목 1">
             <a:extLst>
               <a:ext uri="{FF2B5EF4-FFF2-40B4-BE49-F238E27FC236}">
-                <a16:creationId xmlns:a16="http://schemas.microsoft.com/office/drawing/2014/main" xmlns="" id="{C5831AE2-B019-4ED9-83AD-C38B3BB9AA91}"/>
+                <a16:creationId xmlns:a16="http://schemas.microsoft.com/office/drawing/2014/main" id="{C5831AE2-B019-4ED9-83AD-C38B3BB9AA91}"/>
               </a:ext>
             </a:extLst>
           </p:cNvPr>
@@ -1282,7 +1293,7 @@
           <p:cNvPr id="3" name="내용 개체 틀 2">
             <a:extLst>
               <a:ext uri="{FF2B5EF4-FFF2-40B4-BE49-F238E27FC236}">
-                <a16:creationId xmlns:a16="http://schemas.microsoft.com/office/drawing/2014/main" xmlns="" id="{103F2D92-5630-4625-BAD8-9B9647709768}"/>
+                <a16:creationId xmlns:a16="http://schemas.microsoft.com/office/drawing/2014/main" id="{103F2D92-5630-4625-BAD8-9B9647709768}"/>
               </a:ext>
             </a:extLst>
           </p:cNvPr>
@@ -1344,7 +1355,7 @@
           <p:cNvPr id="4" name="내용 개체 틀 3">
             <a:extLst>
               <a:ext uri="{FF2B5EF4-FFF2-40B4-BE49-F238E27FC236}">
-                <a16:creationId xmlns:a16="http://schemas.microsoft.com/office/drawing/2014/main" xmlns="" id="{83744FE4-F64C-47C8-B9A5-94975C73F51F}"/>
+                <a16:creationId xmlns:a16="http://schemas.microsoft.com/office/drawing/2014/main" id="{83744FE4-F64C-47C8-B9A5-94975C73F51F}"/>
               </a:ext>
             </a:extLst>
           </p:cNvPr>
@@ -1406,7 +1417,7 @@
           <p:cNvPr id="5" name="날짜 개체 틀 4">
             <a:extLst>
               <a:ext uri="{FF2B5EF4-FFF2-40B4-BE49-F238E27FC236}">
-                <a16:creationId xmlns:a16="http://schemas.microsoft.com/office/drawing/2014/main" xmlns="" id="{C19D4485-560B-4241-AC75-4E9AE9F7C321}"/>
+                <a16:creationId xmlns:a16="http://schemas.microsoft.com/office/drawing/2014/main" id="{C19D4485-560B-4241-AC75-4E9AE9F7C321}"/>
               </a:ext>
             </a:extLst>
           </p:cNvPr>
@@ -1425,7 +1436,7 @@
             <a:fld id="{C835A31B-3310-4D1A-9032-E31AE5C76220}" type="datetimeFigureOut">
               <a:rPr lang="ko-KR" altLang="en-US" smtClean="0"/>
               <a:pPr/>
-              <a:t>2019-05-27</a:t>
+              <a:t>2019-05-28</a:t>
             </a:fld>
             <a:endParaRPr lang="ko-KR" altLang="en-US"/>
           </a:p>
@@ -1436,7 +1447,7 @@
           <p:cNvPr id="6" name="바닥글 개체 틀 5">
             <a:extLst>
               <a:ext uri="{FF2B5EF4-FFF2-40B4-BE49-F238E27FC236}">
-                <a16:creationId xmlns:a16="http://schemas.microsoft.com/office/drawing/2014/main" xmlns="" id="{63A4DCA1-8AF8-412C-A381-A165076CB8A6}"/>
+                <a16:creationId xmlns:a16="http://schemas.microsoft.com/office/drawing/2014/main" id="{63A4DCA1-8AF8-412C-A381-A165076CB8A6}"/>
               </a:ext>
             </a:extLst>
           </p:cNvPr>
@@ -1461,7 +1472,7 @@
           <p:cNvPr id="7" name="슬라이드 번호 개체 틀 6">
             <a:extLst>
               <a:ext uri="{FF2B5EF4-FFF2-40B4-BE49-F238E27FC236}">
-                <a16:creationId xmlns:a16="http://schemas.microsoft.com/office/drawing/2014/main" xmlns="" id="{FB0B0454-5DD1-43FC-B8B2-3172044F4AFD}"/>
+                <a16:creationId xmlns:a16="http://schemas.microsoft.com/office/drawing/2014/main" id="{FB0B0454-5DD1-43FC-B8B2-3172044F4AFD}"/>
               </a:ext>
             </a:extLst>
           </p:cNvPr>
@@ -1489,7 +1500,7 @@
     </p:spTree>
     <p:extLst>
       <p:ext uri="{BB962C8B-B14F-4D97-AF65-F5344CB8AC3E}">
-        <p14:creationId xmlns:p14="http://schemas.microsoft.com/office/powerpoint/2010/main" xmlns="" val="997109565"/>
+        <p14:creationId xmlns:p14="http://schemas.microsoft.com/office/powerpoint/2010/main" val="997109565"/>
       </p:ext>
     </p:extLst>
   </p:cSld>
@@ -1521,7 +1532,7 @@
           <p:cNvPr id="2" name="제목 1">
             <a:extLst>
               <a:ext uri="{FF2B5EF4-FFF2-40B4-BE49-F238E27FC236}">
-                <a16:creationId xmlns:a16="http://schemas.microsoft.com/office/drawing/2014/main" xmlns="" id="{EDF37A80-EDCF-40E4-BD73-BCF8DD59F935}"/>
+                <a16:creationId xmlns:a16="http://schemas.microsoft.com/office/drawing/2014/main" id="{EDF37A80-EDCF-40E4-BD73-BCF8DD59F935}"/>
               </a:ext>
             </a:extLst>
           </p:cNvPr>
@@ -1554,7 +1565,7 @@
           <p:cNvPr id="3" name="텍스트 개체 틀 2">
             <a:extLst>
               <a:ext uri="{FF2B5EF4-FFF2-40B4-BE49-F238E27FC236}">
-                <a16:creationId xmlns:a16="http://schemas.microsoft.com/office/drawing/2014/main" xmlns="" id="{497507F3-7EBC-47C9-8A52-839AD98E7D23}"/>
+                <a16:creationId xmlns:a16="http://schemas.microsoft.com/office/drawing/2014/main" id="{497507F3-7EBC-47C9-8A52-839AD98E7D23}"/>
               </a:ext>
             </a:extLst>
           </p:cNvPr>
@@ -1625,7 +1636,7 @@
           <p:cNvPr id="4" name="내용 개체 틀 3">
             <a:extLst>
               <a:ext uri="{FF2B5EF4-FFF2-40B4-BE49-F238E27FC236}">
-                <a16:creationId xmlns:a16="http://schemas.microsoft.com/office/drawing/2014/main" xmlns="" id="{7BEF902C-B93E-40DA-B48B-B2F0F2F86A35}"/>
+                <a16:creationId xmlns:a16="http://schemas.microsoft.com/office/drawing/2014/main" id="{7BEF902C-B93E-40DA-B48B-B2F0F2F86A35}"/>
               </a:ext>
             </a:extLst>
           </p:cNvPr>
@@ -1687,7 +1698,7 @@
           <p:cNvPr id="5" name="텍스트 개체 틀 4">
             <a:extLst>
               <a:ext uri="{FF2B5EF4-FFF2-40B4-BE49-F238E27FC236}">
-                <a16:creationId xmlns:a16="http://schemas.microsoft.com/office/drawing/2014/main" xmlns="" id="{867A3925-9F3A-45EC-B683-01BBABBEBA24}"/>
+                <a16:creationId xmlns:a16="http://schemas.microsoft.com/office/drawing/2014/main" id="{867A3925-9F3A-45EC-B683-01BBABBEBA24}"/>
               </a:ext>
             </a:extLst>
           </p:cNvPr>
@@ -1758,7 +1769,7 @@
           <p:cNvPr id="6" name="내용 개체 틀 5">
             <a:extLst>
               <a:ext uri="{FF2B5EF4-FFF2-40B4-BE49-F238E27FC236}">
-                <a16:creationId xmlns:a16="http://schemas.microsoft.com/office/drawing/2014/main" xmlns="" id="{344A9B63-ECB2-462D-89B9-39D184739A38}"/>
+                <a16:creationId xmlns:a16="http://schemas.microsoft.com/office/drawing/2014/main" id="{344A9B63-ECB2-462D-89B9-39D184739A38}"/>
               </a:ext>
             </a:extLst>
           </p:cNvPr>
@@ -1820,7 +1831,7 @@
           <p:cNvPr id="7" name="날짜 개체 틀 6">
             <a:extLst>
               <a:ext uri="{FF2B5EF4-FFF2-40B4-BE49-F238E27FC236}">
-                <a16:creationId xmlns:a16="http://schemas.microsoft.com/office/drawing/2014/main" xmlns="" id="{FB3FEFC9-C8C7-459A-BD69-7812445C05F3}"/>
+                <a16:creationId xmlns:a16="http://schemas.microsoft.com/office/drawing/2014/main" id="{FB3FEFC9-C8C7-459A-BD69-7812445C05F3}"/>
               </a:ext>
             </a:extLst>
           </p:cNvPr>
@@ -1839,7 +1850,7 @@
             <a:fld id="{C835A31B-3310-4D1A-9032-E31AE5C76220}" type="datetimeFigureOut">
               <a:rPr lang="ko-KR" altLang="en-US" smtClean="0"/>
               <a:pPr/>
-              <a:t>2019-05-27</a:t>
+              <a:t>2019-05-28</a:t>
             </a:fld>
             <a:endParaRPr lang="ko-KR" altLang="en-US"/>
           </a:p>
@@ -1850,7 +1861,7 @@
           <p:cNvPr id="8" name="바닥글 개체 틀 7">
             <a:extLst>
               <a:ext uri="{FF2B5EF4-FFF2-40B4-BE49-F238E27FC236}">
-                <a16:creationId xmlns:a16="http://schemas.microsoft.com/office/drawing/2014/main" xmlns="" id="{E20F9BA8-4F8D-4055-B8D2-3D4EDDAA6A46}"/>
+                <a16:creationId xmlns:a16="http://schemas.microsoft.com/office/drawing/2014/main" id="{E20F9BA8-4F8D-4055-B8D2-3D4EDDAA6A46}"/>
               </a:ext>
             </a:extLst>
           </p:cNvPr>
@@ -1875,7 +1886,7 @@
           <p:cNvPr id="9" name="슬라이드 번호 개체 틀 8">
             <a:extLst>
               <a:ext uri="{FF2B5EF4-FFF2-40B4-BE49-F238E27FC236}">
-                <a16:creationId xmlns:a16="http://schemas.microsoft.com/office/drawing/2014/main" xmlns="" id="{AEB76F71-B48D-4E3C-ACE0-4AA4B3B328F1}"/>
+                <a16:creationId xmlns:a16="http://schemas.microsoft.com/office/drawing/2014/main" id="{AEB76F71-B48D-4E3C-ACE0-4AA4B3B328F1}"/>
               </a:ext>
             </a:extLst>
           </p:cNvPr>
@@ -1903,7 +1914,7 @@
     </p:spTree>
     <p:extLst>
       <p:ext uri="{BB962C8B-B14F-4D97-AF65-F5344CB8AC3E}">
-        <p14:creationId xmlns:p14="http://schemas.microsoft.com/office/powerpoint/2010/main" xmlns="" val="2140597638"/>
+        <p14:creationId xmlns:p14="http://schemas.microsoft.com/office/powerpoint/2010/main" val="2140597638"/>
       </p:ext>
     </p:extLst>
   </p:cSld>
@@ -1935,7 +1946,7 @@
           <p:cNvPr id="2" name="제목 1">
             <a:extLst>
               <a:ext uri="{FF2B5EF4-FFF2-40B4-BE49-F238E27FC236}">
-                <a16:creationId xmlns:a16="http://schemas.microsoft.com/office/drawing/2014/main" xmlns="" id="{0B6B78AB-CEAF-4E0A-A967-2B56B83333D0}"/>
+                <a16:creationId xmlns:a16="http://schemas.microsoft.com/office/drawing/2014/main" id="{0B6B78AB-CEAF-4E0A-A967-2B56B83333D0}"/>
               </a:ext>
             </a:extLst>
           </p:cNvPr>
@@ -1963,7 +1974,7 @@
           <p:cNvPr id="3" name="날짜 개체 틀 2">
             <a:extLst>
               <a:ext uri="{FF2B5EF4-FFF2-40B4-BE49-F238E27FC236}">
-                <a16:creationId xmlns:a16="http://schemas.microsoft.com/office/drawing/2014/main" xmlns="" id="{DFD4D42A-AA59-4EFE-8ED3-64457B030B18}"/>
+                <a16:creationId xmlns:a16="http://schemas.microsoft.com/office/drawing/2014/main" id="{DFD4D42A-AA59-4EFE-8ED3-64457B030B18}"/>
               </a:ext>
             </a:extLst>
           </p:cNvPr>
@@ -1982,7 +1993,7 @@
             <a:fld id="{C835A31B-3310-4D1A-9032-E31AE5C76220}" type="datetimeFigureOut">
               <a:rPr lang="ko-KR" altLang="en-US" smtClean="0"/>
               <a:pPr/>
-              <a:t>2019-05-27</a:t>
+              <a:t>2019-05-28</a:t>
             </a:fld>
             <a:endParaRPr lang="ko-KR" altLang="en-US"/>
           </a:p>
@@ -1993,7 +2004,7 @@
           <p:cNvPr id="4" name="바닥글 개체 틀 3">
             <a:extLst>
               <a:ext uri="{FF2B5EF4-FFF2-40B4-BE49-F238E27FC236}">
-                <a16:creationId xmlns:a16="http://schemas.microsoft.com/office/drawing/2014/main" xmlns="" id="{1BBE6977-F2FB-4D57-971D-D39718082CD3}"/>
+                <a16:creationId xmlns:a16="http://schemas.microsoft.com/office/drawing/2014/main" id="{1BBE6977-F2FB-4D57-971D-D39718082CD3}"/>
               </a:ext>
             </a:extLst>
           </p:cNvPr>
@@ -2018,7 +2029,7 @@
           <p:cNvPr id="5" name="슬라이드 번호 개체 틀 4">
             <a:extLst>
               <a:ext uri="{FF2B5EF4-FFF2-40B4-BE49-F238E27FC236}">
-                <a16:creationId xmlns:a16="http://schemas.microsoft.com/office/drawing/2014/main" xmlns="" id="{8775A1A0-EFBB-4999-ABCF-7FD2FCD87623}"/>
+                <a16:creationId xmlns:a16="http://schemas.microsoft.com/office/drawing/2014/main" id="{8775A1A0-EFBB-4999-ABCF-7FD2FCD87623}"/>
               </a:ext>
             </a:extLst>
           </p:cNvPr>
@@ -2046,7 +2057,7 @@
     </p:spTree>
     <p:extLst>
       <p:ext uri="{BB962C8B-B14F-4D97-AF65-F5344CB8AC3E}">
-        <p14:creationId xmlns:p14="http://schemas.microsoft.com/office/powerpoint/2010/main" xmlns="" val="2998624526"/>
+        <p14:creationId xmlns:p14="http://schemas.microsoft.com/office/powerpoint/2010/main" val="2998624526"/>
       </p:ext>
     </p:extLst>
   </p:cSld>
@@ -2078,7 +2089,7 @@
           <p:cNvPr id="2" name="날짜 개체 틀 1">
             <a:extLst>
               <a:ext uri="{FF2B5EF4-FFF2-40B4-BE49-F238E27FC236}">
-                <a16:creationId xmlns:a16="http://schemas.microsoft.com/office/drawing/2014/main" xmlns="" id="{B341F740-DDD2-4C8E-A337-B6D45AE6B5AE}"/>
+                <a16:creationId xmlns:a16="http://schemas.microsoft.com/office/drawing/2014/main" id="{B341F740-DDD2-4C8E-A337-B6D45AE6B5AE}"/>
               </a:ext>
             </a:extLst>
           </p:cNvPr>
@@ -2097,7 +2108,7 @@
             <a:fld id="{C835A31B-3310-4D1A-9032-E31AE5C76220}" type="datetimeFigureOut">
               <a:rPr lang="ko-KR" altLang="en-US" smtClean="0"/>
               <a:pPr/>
-              <a:t>2019-05-27</a:t>
+              <a:t>2019-05-28</a:t>
             </a:fld>
             <a:endParaRPr lang="ko-KR" altLang="en-US"/>
           </a:p>
@@ -2108,7 +2119,7 @@
           <p:cNvPr id="3" name="바닥글 개체 틀 2">
             <a:extLst>
               <a:ext uri="{FF2B5EF4-FFF2-40B4-BE49-F238E27FC236}">
-                <a16:creationId xmlns:a16="http://schemas.microsoft.com/office/drawing/2014/main" xmlns="" id="{6C1C59E0-B154-4A14-958A-C1BD1D9CAE13}"/>
+                <a16:creationId xmlns:a16="http://schemas.microsoft.com/office/drawing/2014/main" id="{6C1C59E0-B154-4A14-958A-C1BD1D9CAE13}"/>
               </a:ext>
             </a:extLst>
           </p:cNvPr>
@@ -2133,7 +2144,7 @@
           <p:cNvPr id="4" name="슬라이드 번호 개체 틀 3">
             <a:extLst>
               <a:ext uri="{FF2B5EF4-FFF2-40B4-BE49-F238E27FC236}">
-                <a16:creationId xmlns:a16="http://schemas.microsoft.com/office/drawing/2014/main" xmlns="" id="{2EAA6E13-822A-4AAF-A4AB-5EACB7BF3136}"/>
+                <a16:creationId xmlns:a16="http://schemas.microsoft.com/office/drawing/2014/main" id="{2EAA6E13-822A-4AAF-A4AB-5EACB7BF3136}"/>
               </a:ext>
             </a:extLst>
           </p:cNvPr>
@@ -2161,7 +2172,7 @@
     </p:spTree>
     <p:extLst>
       <p:ext uri="{BB962C8B-B14F-4D97-AF65-F5344CB8AC3E}">
-        <p14:creationId xmlns:p14="http://schemas.microsoft.com/office/powerpoint/2010/main" xmlns="" val="2649398460"/>
+        <p14:creationId xmlns:p14="http://schemas.microsoft.com/office/powerpoint/2010/main" val="2649398460"/>
       </p:ext>
     </p:extLst>
   </p:cSld>
@@ -2193,7 +2204,7 @@
           <p:cNvPr id="2" name="제목 1">
             <a:extLst>
               <a:ext uri="{FF2B5EF4-FFF2-40B4-BE49-F238E27FC236}">
-                <a16:creationId xmlns:a16="http://schemas.microsoft.com/office/drawing/2014/main" xmlns="" id="{406606BA-C83B-4C4C-8A9F-A8D877239F34}"/>
+                <a16:creationId xmlns:a16="http://schemas.microsoft.com/office/drawing/2014/main" id="{406606BA-C83B-4C4C-8A9F-A8D877239F34}"/>
               </a:ext>
             </a:extLst>
           </p:cNvPr>
@@ -2230,7 +2241,7 @@
           <p:cNvPr id="3" name="내용 개체 틀 2">
             <a:extLst>
               <a:ext uri="{FF2B5EF4-FFF2-40B4-BE49-F238E27FC236}">
-                <a16:creationId xmlns:a16="http://schemas.microsoft.com/office/drawing/2014/main" xmlns="" id="{DF679CEC-3DD4-4BAB-84AA-40E4B3F4F5EC}"/>
+                <a16:creationId xmlns:a16="http://schemas.microsoft.com/office/drawing/2014/main" id="{DF679CEC-3DD4-4BAB-84AA-40E4B3F4F5EC}"/>
               </a:ext>
             </a:extLst>
           </p:cNvPr>
@@ -2320,7 +2331,7 @@
           <p:cNvPr id="4" name="텍스트 개체 틀 3">
             <a:extLst>
               <a:ext uri="{FF2B5EF4-FFF2-40B4-BE49-F238E27FC236}">
-                <a16:creationId xmlns:a16="http://schemas.microsoft.com/office/drawing/2014/main" xmlns="" id="{5623D926-44A7-4C6D-BBB7-C50D904AF9E3}"/>
+                <a16:creationId xmlns:a16="http://schemas.microsoft.com/office/drawing/2014/main" id="{5623D926-44A7-4C6D-BBB7-C50D904AF9E3}"/>
               </a:ext>
             </a:extLst>
           </p:cNvPr>
@@ -2391,7 +2402,7 @@
           <p:cNvPr id="5" name="날짜 개체 틀 4">
             <a:extLst>
               <a:ext uri="{FF2B5EF4-FFF2-40B4-BE49-F238E27FC236}">
-                <a16:creationId xmlns:a16="http://schemas.microsoft.com/office/drawing/2014/main" xmlns="" id="{C10F76A1-BE98-48F0-9922-C7749C4F06D5}"/>
+                <a16:creationId xmlns:a16="http://schemas.microsoft.com/office/drawing/2014/main" id="{C10F76A1-BE98-48F0-9922-C7749C4F06D5}"/>
               </a:ext>
             </a:extLst>
           </p:cNvPr>
@@ -2410,7 +2421,7 @@
             <a:fld id="{C835A31B-3310-4D1A-9032-E31AE5C76220}" type="datetimeFigureOut">
               <a:rPr lang="ko-KR" altLang="en-US" smtClean="0"/>
               <a:pPr/>
-              <a:t>2019-05-27</a:t>
+              <a:t>2019-05-28</a:t>
             </a:fld>
             <a:endParaRPr lang="ko-KR" altLang="en-US"/>
           </a:p>
@@ -2421,7 +2432,7 @@
           <p:cNvPr id="6" name="바닥글 개체 틀 5">
             <a:extLst>
               <a:ext uri="{FF2B5EF4-FFF2-40B4-BE49-F238E27FC236}">
-                <a16:creationId xmlns:a16="http://schemas.microsoft.com/office/drawing/2014/main" xmlns="" id="{E328358D-8032-4AA6-AD02-5D9B8D24ED6D}"/>
+                <a16:creationId xmlns:a16="http://schemas.microsoft.com/office/drawing/2014/main" id="{E328358D-8032-4AA6-AD02-5D9B8D24ED6D}"/>
               </a:ext>
             </a:extLst>
           </p:cNvPr>
@@ -2446,7 +2457,7 @@
           <p:cNvPr id="7" name="슬라이드 번호 개체 틀 6">
             <a:extLst>
               <a:ext uri="{FF2B5EF4-FFF2-40B4-BE49-F238E27FC236}">
-                <a16:creationId xmlns:a16="http://schemas.microsoft.com/office/drawing/2014/main" xmlns="" id="{246CC950-B929-48D1-A774-91AE8C0C815F}"/>
+                <a16:creationId xmlns:a16="http://schemas.microsoft.com/office/drawing/2014/main" id="{246CC950-B929-48D1-A774-91AE8C0C815F}"/>
               </a:ext>
             </a:extLst>
           </p:cNvPr>
@@ -2474,7 +2485,7 @@
     </p:spTree>
     <p:extLst>
       <p:ext uri="{BB962C8B-B14F-4D97-AF65-F5344CB8AC3E}">
-        <p14:creationId xmlns:p14="http://schemas.microsoft.com/office/powerpoint/2010/main" xmlns="" val="2187968273"/>
+        <p14:creationId xmlns:p14="http://schemas.microsoft.com/office/powerpoint/2010/main" val="2187968273"/>
       </p:ext>
     </p:extLst>
   </p:cSld>
@@ -2506,7 +2517,7 @@
           <p:cNvPr id="2" name="제목 1">
             <a:extLst>
               <a:ext uri="{FF2B5EF4-FFF2-40B4-BE49-F238E27FC236}">
-                <a16:creationId xmlns:a16="http://schemas.microsoft.com/office/drawing/2014/main" xmlns="" id="{277EA745-2D66-40E9-ABC9-8055523A9472}"/>
+                <a16:creationId xmlns:a16="http://schemas.microsoft.com/office/drawing/2014/main" id="{277EA745-2D66-40E9-ABC9-8055523A9472}"/>
               </a:ext>
             </a:extLst>
           </p:cNvPr>
@@ -2543,7 +2554,7 @@
           <p:cNvPr id="3" name="그림 개체 틀 2">
             <a:extLst>
               <a:ext uri="{FF2B5EF4-FFF2-40B4-BE49-F238E27FC236}">
-                <a16:creationId xmlns:a16="http://schemas.microsoft.com/office/drawing/2014/main" xmlns="" id="{5A1BE344-2B30-4592-8F6C-0D7ABE5C4AAD}"/>
+                <a16:creationId xmlns:a16="http://schemas.microsoft.com/office/drawing/2014/main" id="{5A1BE344-2B30-4592-8F6C-0D7ABE5C4AAD}"/>
               </a:ext>
             </a:extLst>
           </p:cNvPr>
@@ -2610,7 +2621,7 @@
           <p:cNvPr id="4" name="텍스트 개체 틀 3">
             <a:extLst>
               <a:ext uri="{FF2B5EF4-FFF2-40B4-BE49-F238E27FC236}">
-                <a16:creationId xmlns:a16="http://schemas.microsoft.com/office/drawing/2014/main" xmlns="" id="{78F07567-B548-487A-9F48-36079236B270}"/>
+                <a16:creationId xmlns:a16="http://schemas.microsoft.com/office/drawing/2014/main" id="{78F07567-B548-487A-9F48-36079236B270}"/>
               </a:ext>
             </a:extLst>
           </p:cNvPr>
@@ -2681,7 +2692,7 @@
           <p:cNvPr id="5" name="날짜 개체 틀 4">
             <a:extLst>
               <a:ext uri="{FF2B5EF4-FFF2-40B4-BE49-F238E27FC236}">
-                <a16:creationId xmlns:a16="http://schemas.microsoft.com/office/drawing/2014/main" xmlns="" id="{37A3A797-B513-4BFD-8DD3-C0B75D58DA3C}"/>
+                <a16:creationId xmlns:a16="http://schemas.microsoft.com/office/drawing/2014/main" id="{37A3A797-B513-4BFD-8DD3-C0B75D58DA3C}"/>
               </a:ext>
             </a:extLst>
           </p:cNvPr>
@@ -2700,7 +2711,7 @@
             <a:fld id="{C835A31B-3310-4D1A-9032-E31AE5C76220}" type="datetimeFigureOut">
               <a:rPr lang="ko-KR" altLang="en-US" smtClean="0"/>
               <a:pPr/>
-              <a:t>2019-05-27</a:t>
+              <a:t>2019-05-28</a:t>
             </a:fld>
             <a:endParaRPr lang="ko-KR" altLang="en-US"/>
           </a:p>
@@ -2711,7 +2722,7 @@
           <p:cNvPr id="6" name="바닥글 개체 틀 5">
             <a:extLst>
               <a:ext uri="{FF2B5EF4-FFF2-40B4-BE49-F238E27FC236}">
-                <a16:creationId xmlns:a16="http://schemas.microsoft.com/office/drawing/2014/main" xmlns="" id="{123CC16F-DF53-4868-B363-63A7363AF06A}"/>
+                <a16:creationId xmlns:a16="http://schemas.microsoft.com/office/drawing/2014/main" id="{123CC16F-DF53-4868-B363-63A7363AF06A}"/>
               </a:ext>
             </a:extLst>
           </p:cNvPr>
@@ -2736,7 +2747,7 @@
           <p:cNvPr id="7" name="슬라이드 번호 개체 틀 6">
             <a:extLst>
               <a:ext uri="{FF2B5EF4-FFF2-40B4-BE49-F238E27FC236}">
-                <a16:creationId xmlns:a16="http://schemas.microsoft.com/office/drawing/2014/main" xmlns="" id="{6CEE7ED3-CE40-4F37-A085-C9D9B2C2B77F}"/>
+                <a16:creationId xmlns:a16="http://schemas.microsoft.com/office/drawing/2014/main" id="{6CEE7ED3-CE40-4F37-A085-C9D9B2C2B77F}"/>
               </a:ext>
             </a:extLst>
           </p:cNvPr>
@@ -2764,7 +2775,7 @@
     </p:spTree>
     <p:extLst>
       <p:ext uri="{BB962C8B-B14F-4D97-AF65-F5344CB8AC3E}">
-        <p14:creationId xmlns:p14="http://schemas.microsoft.com/office/powerpoint/2010/main" xmlns="" val="4104880961"/>
+        <p14:creationId xmlns:p14="http://schemas.microsoft.com/office/powerpoint/2010/main" val="4104880961"/>
       </p:ext>
     </p:extLst>
   </p:cSld>
@@ -2801,7 +2812,7 @@
           <p:cNvPr id="2" name="제목 개체 틀 1">
             <a:extLst>
               <a:ext uri="{FF2B5EF4-FFF2-40B4-BE49-F238E27FC236}">
-                <a16:creationId xmlns:a16="http://schemas.microsoft.com/office/drawing/2014/main" xmlns="" id="{B2BF3505-8A88-41F9-A09F-1189B1DD2559}"/>
+                <a16:creationId xmlns:a16="http://schemas.microsoft.com/office/drawing/2014/main" id="{B2BF3505-8A88-41F9-A09F-1189B1DD2559}"/>
               </a:ext>
             </a:extLst>
           </p:cNvPr>
@@ -2839,7 +2850,7 @@
           <p:cNvPr id="3" name="텍스트 개체 틀 2">
             <a:extLst>
               <a:ext uri="{FF2B5EF4-FFF2-40B4-BE49-F238E27FC236}">
-                <a16:creationId xmlns:a16="http://schemas.microsoft.com/office/drawing/2014/main" xmlns="" id="{ADB012B8-8C20-4B05-B036-281C897B3D2A}"/>
+                <a16:creationId xmlns:a16="http://schemas.microsoft.com/office/drawing/2014/main" id="{ADB012B8-8C20-4B05-B036-281C897B3D2A}"/>
               </a:ext>
             </a:extLst>
           </p:cNvPr>
@@ -2906,7 +2917,7 @@
           <p:cNvPr id="4" name="날짜 개체 틀 3">
             <a:extLst>
               <a:ext uri="{FF2B5EF4-FFF2-40B4-BE49-F238E27FC236}">
-                <a16:creationId xmlns:a16="http://schemas.microsoft.com/office/drawing/2014/main" xmlns="" id="{68C2CFE4-7E11-4BB7-AACD-8E93F75F507B}"/>
+                <a16:creationId xmlns:a16="http://schemas.microsoft.com/office/drawing/2014/main" id="{68C2CFE4-7E11-4BB7-AACD-8E93F75F507B}"/>
               </a:ext>
             </a:extLst>
           </p:cNvPr>
@@ -2943,7 +2954,7 @@
             <a:fld id="{C835A31B-3310-4D1A-9032-E31AE5C76220}" type="datetimeFigureOut">
               <a:rPr lang="ko-KR" altLang="en-US" smtClean="0"/>
               <a:pPr/>
-              <a:t>2019-05-27</a:t>
+              <a:t>2019-05-28</a:t>
             </a:fld>
             <a:endParaRPr lang="ko-KR" altLang="en-US"/>
           </a:p>
@@ -2954,7 +2965,7 @@
           <p:cNvPr id="5" name="바닥글 개체 틀 4">
             <a:extLst>
               <a:ext uri="{FF2B5EF4-FFF2-40B4-BE49-F238E27FC236}">
-                <a16:creationId xmlns:a16="http://schemas.microsoft.com/office/drawing/2014/main" xmlns="" id="{1E25471E-31F1-4BD4-96D0-803764DFDD24}"/>
+                <a16:creationId xmlns:a16="http://schemas.microsoft.com/office/drawing/2014/main" id="{1E25471E-31F1-4BD4-96D0-803764DFDD24}"/>
               </a:ext>
             </a:extLst>
           </p:cNvPr>
@@ -2997,7 +3008,7 @@
           <p:cNvPr id="6" name="슬라이드 번호 개체 틀 5">
             <a:extLst>
               <a:ext uri="{FF2B5EF4-FFF2-40B4-BE49-F238E27FC236}">
-                <a16:creationId xmlns:a16="http://schemas.microsoft.com/office/drawing/2014/main" xmlns="" id="{497CD1CC-9F8C-4DDC-8FE7-3254161D06B1}"/>
+                <a16:creationId xmlns:a16="http://schemas.microsoft.com/office/drawing/2014/main" id="{497CD1CC-9F8C-4DDC-8FE7-3254161D06B1}"/>
               </a:ext>
             </a:extLst>
           </p:cNvPr>
@@ -3043,7 +3054,7 @@
     </p:spTree>
     <p:extLst>
       <p:ext uri="{BB962C8B-B14F-4D97-AF65-F5344CB8AC3E}">
-        <p14:creationId xmlns:p14="http://schemas.microsoft.com/office/powerpoint/2010/main" xmlns="" val="1031370516"/>
+        <p14:creationId xmlns:p14="http://schemas.microsoft.com/office/powerpoint/2010/main" val="1031370516"/>
       </p:ext>
     </p:extLst>
   </p:cSld>
@@ -3366,7 +3377,7 @@
           <p:cNvPr id="7" name="직사각형 6">
             <a:extLst>
               <a:ext uri="{FF2B5EF4-FFF2-40B4-BE49-F238E27FC236}">
-                <a16:creationId xmlns:a16="http://schemas.microsoft.com/office/drawing/2014/main" xmlns="" id="{47D87A93-BCA3-474C-B7F8-FDE2F40A3ECB}"/>
+                <a16:creationId xmlns:a16="http://schemas.microsoft.com/office/drawing/2014/main" id="{47D87A93-BCA3-474C-B7F8-FDE2F40A3ECB}"/>
               </a:ext>
             </a:extLst>
           </p:cNvPr>
@@ -3432,7 +3443,7 @@
           <p:cNvPr id="45" name="사각형: 둥근 모서리 44">
             <a:extLst>
               <a:ext uri="{FF2B5EF4-FFF2-40B4-BE49-F238E27FC236}">
-                <a16:creationId xmlns:a16="http://schemas.microsoft.com/office/drawing/2014/main" xmlns="" id="{596BAF86-47ED-42B3-8C78-DD2F9B77466C}"/>
+                <a16:creationId xmlns:a16="http://schemas.microsoft.com/office/drawing/2014/main" id="{596BAF86-47ED-42B3-8C78-DD2F9B77466C}"/>
               </a:ext>
             </a:extLst>
           </p:cNvPr>
@@ -3484,7 +3495,7 @@
           <p:cNvPr id="4" name="TextBox 3">
             <a:extLst>
               <a:ext uri="{FF2B5EF4-FFF2-40B4-BE49-F238E27FC236}">
-                <a16:creationId xmlns:a16="http://schemas.microsoft.com/office/drawing/2014/main" xmlns="" id="{2680B476-8CED-403A-88D7-96A2CAA2F7AB}"/>
+                <a16:creationId xmlns:a16="http://schemas.microsoft.com/office/drawing/2014/main" id="{2680B476-8CED-403A-88D7-96A2CAA2F7AB}"/>
               </a:ext>
             </a:extLst>
           </p:cNvPr>
@@ -3570,7 +3581,7 @@
           <p:cNvPr id="5" name="TextBox 4">
             <a:extLst>
               <a:ext uri="{FF2B5EF4-FFF2-40B4-BE49-F238E27FC236}">
-                <a16:creationId xmlns:a16="http://schemas.microsoft.com/office/drawing/2014/main" xmlns="" id="{98BA926B-7235-4AAA-B661-284FE70A5CB1}"/>
+                <a16:creationId xmlns:a16="http://schemas.microsoft.com/office/drawing/2014/main" id="{98BA926B-7235-4AAA-B661-284FE70A5CB1}"/>
               </a:ext>
             </a:extLst>
           </p:cNvPr>
@@ -3770,7 +3781,7 @@
           <p:cNvPr id="14" name="TextBox 13">
             <a:extLst>
               <a:ext uri="{FF2B5EF4-FFF2-40B4-BE49-F238E27FC236}">
-                <a16:creationId xmlns:a16="http://schemas.microsoft.com/office/drawing/2014/main" xmlns="" id="{59F1228D-436C-437F-8AE5-657282A0A558}"/>
+                <a16:creationId xmlns:a16="http://schemas.microsoft.com/office/drawing/2014/main" id="{59F1228D-436C-437F-8AE5-657282A0A558}"/>
               </a:ext>
             </a:extLst>
           </p:cNvPr>
@@ -3851,7 +3862,7 @@
           <p:cNvPr id="20" name="말풍선: 모서리가 둥근 사각형 19">
             <a:extLst>
               <a:ext uri="{FF2B5EF4-FFF2-40B4-BE49-F238E27FC236}">
-                <a16:creationId xmlns:a16="http://schemas.microsoft.com/office/drawing/2014/main" xmlns="" id="{DCA31AB8-323B-4DAB-A928-163CB1704A58}"/>
+                <a16:creationId xmlns:a16="http://schemas.microsoft.com/office/drawing/2014/main" id="{DCA31AB8-323B-4DAB-A928-163CB1704A58}"/>
               </a:ext>
             </a:extLst>
           </p:cNvPr>
@@ -3920,7 +3931,7 @@
           <p:cNvPr id="37" name="그룹 36">
             <a:extLst>
               <a:ext uri="{FF2B5EF4-FFF2-40B4-BE49-F238E27FC236}">
-                <a16:creationId xmlns:a16="http://schemas.microsoft.com/office/drawing/2014/main" xmlns="" id="{627B52D8-1239-4A23-B5ED-C6DF68AA2C02}"/>
+                <a16:creationId xmlns:a16="http://schemas.microsoft.com/office/drawing/2014/main" id="{627B52D8-1239-4A23-B5ED-C6DF68AA2C02}"/>
               </a:ext>
             </a:extLst>
           </p:cNvPr>
@@ -3940,7 +3951,7 @@
             <p:cNvPr id="21" name="타원 20">
               <a:extLst>
                 <a:ext uri="{FF2B5EF4-FFF2-40B4-BE49-F238E27FC236}">
-                  <a16:creationId xmlns:a16="http://schemas.microsoft.com/office/drawing/2014/main" xmlns="" id="{13D8C323-C277-486E-9570-872B45782206}"/>
+                  <a16:creationId xmlns:a16="http://schemas.microsoft.com/office/drawing/2014/main" id="{13D8C323-C277-486E-9570-872B45782206}"/>
                 </a:ext>
               </a:extLst>
             </p:cNvPr>
@@ -3992,7 +4003,7 @@
             <p:cNvPr id="22" name="타원 21">
               <a:extLst>
                 <a:ext uri="{FF2B5EF4-FFF2-40B4-BE49-F238E27FC236}">
-                  <a16:creationId xmlns:a16="http://schemas.microsoft.com/office/drawing/2014/main" xmlns="" id="{12CEA177-6AFF-47B2-9077-4C917E71C238}"/>
+                  <a16:creationId xmlns:a16="http://schemas.microsoft.com/office/drawing/2014/main" id="{12CEA177-6AFF-47B2-9077-4C917E71C238}"/>
                 </a:ext>
               </a:extLst>
             </p:cNvPr>
@@ -4044,7 +4055,7 @@
             <p:cNvPr id="23" name="타원 22">
               <a:extLst>
                 <a:ext uri="{FF2B5EF4-FFF2-40B4-BE49-F238E27FC236}">
-                  <a16:creationId xmlns:a16="http://schemas.microsoft.com/office/drawing/2014/main" xmlns="" id="{41EF5D07-484C-409A-9E81-EE8D4155AAB6}"/>
+                  <a16:creationId xmlns:a16="http://schemas.microsoft.com/office/drawing/2014/main" id="{41EF5D07-484C-409A-9E81-EE8D4155AAB6}"/>
                 </a:ext>
               </a:extLst>
             </p:cNvPr>
@@ -4096,7 +4107,7 @@
             <p:cNvPr id="27" name="직선 연결선 26">
               <a:extLst>
                 <a:ext uri="{FF2B5EF4-FFF2-40B4-BE49-F238E27FC236}">
-                  <a16:creationId xmlns:a16="http://schemas.microsoft.com/office/drawing/2014/main" xmlns="" id="{1D3FAABC-AA7C-4AA2-8352-12D15842E222}"/>
+                  <a16:creationId xmlns:a16="http://schemas.microsoft.com/office/drawing/2014/main" id="{1D3FAABC-AA7C-4AA2-8352-12D15842E222}"/>
                 </a:ext>
               </a:extLst>
             </p:cNvPr>
@@ -4140,7 +4151,7 @@
             <p:cNvPr id="28" name="직선 연결선 27">
               <a:extLst>
                 <a:ext uri="{FF2B5EF4-FFF2-40B4-BE49-F238E27FC236}">
-                  <a16:creationId xmlns:a16="http://schemas.microsoft.com/office/drawing/2014/main" xmlns="" id="{E8593AA4-4F6B-43FD-9EF5-E4A7792DE356}"/>
+                  <a16:creationId xmlns:a16="http://schemas.microsoft.com/office/drawing/2014/main" id="{E8593AA4-4F6B-43FD-9EF5-E4A7792DE356}"/>
                 </a:ext>
               </a:extLst>
             </p:cNvPr>
@@ -4185,7 +4196,7 @@
           <p:cNvPr id="38" name="그룹 37">
             <a:extLst>
               <a:ext uri="{FF2B5EF4-FFF2-40B4-BE49-F238E27FC236}">
-                <a16:creationId xmlns:a16="http://schemas.microsoft.com/office/drawing/2014/main" xmlns="" id="{8232BE26-AE4D-4540-A2C6-F0277CE0582F}"/>
+                <a16:creationId xmlns:a16="http://schemas.microsoft.com/office/drawing/2014/main" id="{8232BE26-AE4D-4540-A2C6-F0277CE0582F}"/>
               </a:ext>
             </a:extLst>
           </p:cNvPr>
@@ -4205,7 +4216,7 @@
             <p:cNvPr id="30" name="하트 29">
               <a:extLst>
                 <a:ext uri="{FF2B5EF4-FFF2-40B4-BE49-F238E27FC236}">
-                  <a16:creationId xmlns:a16="http://schemas.microsoft.com/office/drawing/2014/main" xmlns="" id="{7D882461-DBFD-4F62-8971-BE379791647A}"/>
+                  <a16:creationId xmlns:a16="http://schemas.microsoft.com/office/drawing/2014/main" id="{7D882461-DBFD-4F62-8971-BE379791647A}"/>
                 </a:ext>
               </a:extLst>
             </p:cNvPr>
@@ -4257,7 +4268,7 @@
             <p:cNvPr id="31" name="하트 30">
               <a:extLst>
                 <a:ext uri="{FF2B5EF4-FFF2-40B4-BE49-F238E27FC236}">
-                  <a16:creationId xmlns:a16="http://schemas.microsoft.com/office/drawing/2014/main" xmlns="" id="{F20160CC-56FA-4C00-B8FA-CB5A097AED5F}"/>
+                  <a16:creationId xmlns:a16="http://schemas.microsoft.com/office/drawing/2014/main" id="{F20160CC-56FA-4C00-B8FA-CB5A097AED5F}"/>
                 </a:ext>
               </a:extLst>
             </p:cNvPr>
@@ -4309,7 +4320,7 @@
             <p:cNvPr id="32" name="하트 31">
               <a:extLst>
                 <a:ext uri="{FF2B5EF4-FFF2-40B4-BE49-F238E27FC236}">
-                  <a16:creationId xmlns:a16="http://schemas.microsoft.com/office/drawing/2014/main" xmlns="" id="{41D7C195-4EC4-4E3A-BDDB-6B6B2585EA4D}"/>
+                  <a16:creationId xmlns:a16="http://schemas.microsoft.com/office/drawing/2014/main" id="{41D7C195-4EC4-4E3A-BDDB-6B6B2585EA4D}"/>
                 </a:ext>
               </a:extLst>
             </p:cNvPr>
@@ -4362,7 +4373,7 @@
           <p:cNvPr id="46" name="그룹 45">
             <a:extLst>
               <a:ext uri="{FF2B5EF4-FFF2-40B4-BE49-F238E27FC236}">
-                <a16:creationId xmlns:a16="http://schemas.microsoft.com/office/drawing/2014/main" xmlns="" id="{6DA0FEFD-A7B7-4682-9D6E-EBF402E1E07F}"/>
+                <a16:creationId xmlns:a16="http://schemas.microsoft.com/office/drawing/2014/main" id="{6DA0FEFD-A7B7-4682-9D6E-EBF402E1E07F}"/>
               </a:ext>
             </a:extLst>
           </p:cNvPr>
@@ -4382,7 +4393,7 @@
             <p:cNvPr id="9" name="사각형: 둥근 모서리 8">
               <a:extLst>
                 <a:ext uri="{FF2B5EF4-FFF2-40B4-BE49-F238E27FC236}">
-                  <a16:creationId xmlns:a16="http://schemas.microsoft.com/office/drawing/2014/main" xmlns="" id="{BEBD7B1B-842C-48C2-A039-0924B58DCAD1}"/>
+                  <a16:creationId xmlns:a16="http://schemas.microsoft.com/office/drawing/2014/main" id="{BEBD7B1B-842C-48C2-A039-0924B58DCAD1}"/>
                 </a:ext>
               </a:extLst>
             </p:cNvPr>
@@ -4439,7 +4450,7 @@
             <p:cNvPr id="10" name="직사각형 9">
               <a:extLst>
                 <a:ext uri="{FF2B5EF4-FFF2-40B4-BE49-F238E27FC236}">
-                  <a16:creationId xmlns:a16="http://schemas.microsoft.com/office/drawing/2014/main" xmlns="" id="{BC282A83-383B-46C1-A764-CED414A0E866}"/>
+                  <a16:creationId xmlns:a16="http://schemas.microsoft.com/office/drawing/2014/main" id="{BC282A83-383B-46C1-A764-CED414A0E866}"/>
                 </a:ext>
               </a:extLst>
             </p:cNvPr>
@@ -4488,7 +4499,7 @@
             <p:cNvPr id="41" name="TextBox 40">
               <a:extLst>
                 <a:ext uri="{FF2B5EF4-FFF2-40B4-BE49-F238E27FC236}">
-                  <a16:creationId xmlns:a16="http://schemas.microsoft.com/office/drawing/2014/main" xmlns="" id="{6852174F-8B9B-4B8E-B504-AE6EC747EE79}"/>
+                  <a16:creationId xmlns:a16="http://schemas.microsoft.com/office/drawing/2014/main" id="{6852174F-8B9B-4B8E-B504-AE6EC747EE79}"/>
                 </a:ext>
               </a:extLst>
             </p:cNvPr>
@@ -4621,7 +4632,7 @@
             <p:cNvPr id="42" name="TextBox 41">
               <a:extLst>
                 <a:ext uri="{FF2B5EF4-FFF2-40B4-BE49-F238E27FC236}">
-                  <a16:creationId xmlns:a16="http://schemas.microsoft.com/office/drawing/2014/main" xmlns="" id="{9C2D76EE-5F97-48E4-A08B-7044516BE38D}"/>
+                  <a16:creationId xmlns:a16="http://schemas.microsoft.com/office/drawing/2014/main" id="{9C2D76EE-5F97-48E4-A08B-7044516BE38D}"/>
                 </a:ext>
               </a:extLst>
             </p:cNvPr>
@@ -4674,7 +4685,7 @@
             <p:cNvPr id="44" name="직선 연결선 43">
               <a:extLst>
                 <a:ext uri="{FF2B5EF4-FFF2-40B4-BE49-F238E27FC236}">
-                  <a16:creationId xmlns:a16="http://schemas.microsoft.com/office/drawing/2014/main" xmlns="" id="{31B2AD8F-81FA-4DE8-B186-CA2D7193D702}"/>
+                  <a16:creationId xmlns:a16="http://schemas.microsoft.com/office/drawing/2014/main" id="{31B2AD8F-81FA-4DE8-B186-CA2D7193D702}"/>
                 </a:ext>
               </a:extLst>
             </p:cNvPr>
@@ -4718,7 +4729,7 @@
           <p:cNvPr id="47" name="화살표: 위쪽 46">
             <a:extLst>
               <a:ext uri="{FF2B5EF4-FFF2-40B4-BE49-F238E27FC236}">
-                <a16:creationId xmlns:a16="http://schemas.microsoft.com/office/drawing/2014/main" xmlns="" id="{5210DE9F-86E4-4D41-A330-31FF540DA06C}"/>
+                <a16:creationId xmlns:a16="http://schemas.microsoft.com/office/drawing/2014/main" id="{5210DE9F-86E4-4D41-A330-31FF540DA06C}"/>
               </a:ext>
             </a:extLst>
           </p:cNvPr>
@@ -4772,7 +4783,7 @@
           <p:cNvPr id="33" name="말풍선: 모서리가 둥근 사각형 32">
             <a:extLst>
               <a:ext uri="{FF2B5EF4-FFF2-40B4-BE49-F238E27FC236}">
-                <a16:creationId xmlns:a16="http://schemas.microsoft.com/office/drawing/2014/main" xmlns="" id="{F46F9A5D-AAA8-495A-8F6D-B4294154B18E}"/>
+                <a16:creationId xmlns:a16="http://schemas.microsoft.com/office/drawing/2014/main" id="{F46F9A5D-AAA8-495A-8F6D-B4294154B18E}"/>
               </a:ext>
             </a:extLst>
           </p:cNvPr>
@@ -4869,7 +4880,7 @@
           <p:cNvPr id="34" name="말풍선: 모서리가 둥근 사각형 33">
             <a:extLst>
               <a:ext uri="{FF2B5EF4-FFF2-40B4-BE49-F238E27FC236}">
-                <a16:creationId xmlns:a16="http://schemas.microsoft.com/office/drawing/2014/main" xmlns="" id="{F5A3B3E4-B900-4C4F-918C-6FC5522B4733}"/>
+                <a16:creationId xmlns:a16="http://schemas.microsoft.com/office/drawing/2014/main" id="{F5A3B3E4-B900-4C4F-918C-6FC5522B4733}"/>
               </a:ext>
             </a:extLst>
           </p:cNvPr>
@@ -4936,7 +4947,7 @@
     </p:spTree>
     <p:extLst>
       <p:ext uri="{BB962C8B-B14F-4D97-AF65-F5344CB8AC3E}">
-        <p14:creationId xmlns:p14="http://schemas.microsoft.com/office/powerpoint/2010/main" xmlns="" val="2910545878"/>
+        <p14:creationId xmlns:p14="http://schemas.microsoft.com/office/powerpoint/2010/main" val="2910545878"/>
       </p:ext>
     </p:extLst>
   </p:cSld>
@@ -4968,7 +4979,7 @@
           <p:cNvPr id="4" name="직사각형 3">
             <a:extLst>
               <a:ext uri="{FF2B5EF4-FFF2-40B4-BE49-F238E27FC236}">
-                <a16:creationId xmlns:a16="http://schemas.microsoft.com/office/drawing/2014/main" xmlns="" id="{FE483315-6421-4AF3-B26D-D5BA89E6CA0C}"/>
+                <a16:creationId xmlns:a16="http://schemas.microsoft.com/office/drawing/2014/main" id="{FE483315-6421-4AF3-B26D-D5BA89E6CA0C}"/>
               </a:ext>
             </a:extLst>
           </p:cNvPr>
@@ -5020,7 +5031,7 @@
           <p:cNvPr id="9" name="TextBox 8">
             <a:extLst>
               <a:ext uri="{FF2B5EF4-FFF2-40B4-BE49-F238E27FC236}">
-                <a16:creationId xmlns:a16="http://schemas.microsoft.com/office/drawing/2014/main" xmlns="" id="{CED07928-F43B-41D3-91E2-9FA98C5E1688}"/>
+                <a16:creationId xmlns:a16="http://schemas.microsoft.com/office/drawing/2014/main" id="{CED07928-F43B-41D3-91E2-9FA98C5E1688}"/>
               </a:ext>
             </a:extLst>
           </p:cNvPr>
@@ -5100,7 +5111,7 @@
           <p:cNvPr id="10" name="TextBox 9">
             <a:extLst>
               <a:ext uri="{FF2B5EF4-FFF2-40B4-BE49-F238E27FC236}">
-                <a16:creationId xmlns:a16="http://schemas.microsoft.com/office/drawing/2014/main" xmlns="" id="{48698CC2-BC68-4E65-9095-9B971AE42A7B}"/>
+                <a16:creationId xmlns:a16="http://schemas.microsoft.com/office/drawing/2014/main" id="{48698CC2-BC68-4E65-9095-9B971AE42A7B}"/>
               </a:ext>
             </a:extLst>
           </p:cNvPr>
@@ -5152,7 +5163,7 @@
           <p:cNvPr id="7" name="TextBox 6">
             <a:extLst>
               <a:ext uri="{FF2B5EF4-FFF2-40B4-BE49-F238E27FC236}">
-                <a16:creationId xmlns:a16="http://schemas.microsoft.com/office/drawing/2014/main" xmlns="" id="{A5F46E98-F701-49B9-93CD-BA7A25B54242}"/>
+                <a16:creationId xmlns:a16="http://schemas.microsoft.com/office/drawing/2014/main" id="{A5F46E98-F701-49B9-93CD-BA7A25B54242}"/>
               </a:ext>
             </a:extLst>
           </p:cNvPr>
@@ -5285,7 +5296,7 @@
           <p:cNvPr id="3" name="그림 2">
             <a:extLst>
               <a:ext uri="{FF2B5EF4-FFF2-40B4-BE49-F238E27FC236}">
-                <a16:creationId xmlns:a16="http://schemas.microsoft.com/office/drawing/2014/main" xmlns="" id="{DB39EB18-1B27-456A-8CC9-64E49AFBCDC9}"/>
+                <a16:creationId xmlns:a16="http://schemas.microsoft.com/office/drawing/2014/main" id="{DB39EB18-1B27-456A-8CC9-64E49AFBCDC9}"/>
               </a:ext>
             </a:extLst>
           </p:cNvPr>
@@ -5298,7 +5309,7 @@
           <a:blip r:embed="rId2" cstate="print">
             <a:extLst>
               <a:ext uri="{28A0092B-C50C-407E-A947-70E740481C1C}">
-                <a14:useLocalDpi xmlns:a14="http://schemas.microsoft.com/office/drawing/2010/main" xmlns="" val="0"/>
+                <a14:useLocalDpi xmlns:a14="http://schemas.microsoft.com/office/drawing/2010/main" val="0"/>
               </a:ext>
             </a:extLst>
           </a:blip>
@@ -5321,7 +5332,7 @@
           <p:cNvPr id="8" name="TextBox 7">
             <a:extLst>
               <a:ext uri="{FF2B5EF4-FFF2-40B4-BE49-F238E27FC236}">
-                <a16:creationId xmlns:a16="http://schemas.microsoft.com/office/drawing/2014/main" xmlns="" id="{010DF240-920B-4843-8EE1-B4D1A8CFD219}"/>
+                <a16:creationId xmlns:a16="http://schemas.microsoft.com/office/drawing/2014/main" id="{010DF240-920B-4843-8EE1-B4D1A8CFD219}"/>
               </a:ext>
             </a:extLst>
           </p:cNvPr>
@@ -5349,15 +5360,15 @@
               <a:t>- </a:t>
             </a:r>
             <a:r>
-              <a:rPr lang="ko-KR" altLang="en-US" dirty="0" smtClean="0"/>
+              <a:rPr lang="ko-KR" altLang="en-US" dirty="0"/>
               <a:t>성장 레벨을 나타내는 </a:t>
             </a:r>
             <a:r>
-              <a:rPr lang="en-US" altLang="ko-KR" dirty="0" smtClean="0"/>
+              <a:rPr lang="en-US" altLang="ko-KR" dirty="0"/>
               <a:t>level </a:t>
             </a:r>
             <a:r>
-              <a:rPr lang="ko-KR" altLang="en-US" dirty="0" smtClean="0"/>
+              <a:rPr lang="ko-KR" altLang="en-US" dirty="0"/>
               <a:t>변수</a:t>
             </a:r>
             <a:endParaRPr lang="en-US" altLang="ko-KR" dirty="0"/>
@@ -5371,40 +5382,36 @@
               <a:buChar char="-"/>
             </a:pPr>
             <a:r>
-              <a:rPr lang="en-US" altLang="ko-KR" dirty="0" smtClean="0"/>
+              <a:rPr lang="en-US" altLang="ko-KR" dirty="0"/>
               <a:t>Input</a:t>
             </a:r>
             <a:r>
-              <a:rPr lang="ko-KR" altLang="en-US" dirty="0" smtClean="0"/>
-              <a:t>으로 </a:t>
-            </a:r>
-            <a:r>
-              <a:rPr lang="ko-KR" altLang="en-US" dirty="0" smtClean="0"/>
-              <a:t>받은 좌표가 해당 물체의 좌표와 동일한지 </a:t>
-            </a:r>
-            <a:endParaRPr lang="en-US" altLang="ko-KR" dirty="0" smtClean="0"/>
-          </a:p>
-          <a:p>
-            <a:r>
-              <a:rPr lang="en-US" altLang="ko-KR" dirty="0" smtClean="0"/>
+              <a:rPr lang="ko-KR" altLang="en-US" dirty="0"/>
+              <a:t>으로 받은 좌표가 해당 물체의 좌표와 동일한지 </a:t>
+            </a:r>
+            <a:endParaRPr lang="en-US" altLang="ko-KR" dirty="0"/>
+          </a:p>
+          <a:p>
+            <a:r>
+              <a:rPr lang="en-US" altLang="ko-KR" dirty="0"/>
               <a:t> </a:t>
             </a:r>
             <a:r>
-              <a:rPr lang="ko-KR" altLang="en-US" dirty="0" smtClean="0"/>
+              <a:rPr lang="ko-KR" altLang="en-US" dirty="0"/>
               <a:t>확인 하기 위한 </a:t>
             </a:r>
             <a:r>
-              <a:rPr lang="ko-KR" altLang="en-US" dirty="0" err="1" smtClean="0"/>
+              <a:rPr lang="ko-KR" altLang="en-US" dirty="0" err="1"/>
               <a:t>메소드</a:t>
             </a:r>
-            <a:endParaRPr lang="en-US" altLang="ko-KR" dirty="0" smtClean="0"/>
+            <a:endParaRPr lang="en-US" altLang="ko-KR" dirty="0"/>
           </a:p>
           <a:p>
             <a:pPr>
               <a:buFontTx/>
               <a:buChar char="-"/>
             </a:pPr>
-            <a:endParaRPr lang="en-US" altLang="ko-KR" dirty="0" smtClean="0"/>
+            <a:endParaRPr lang="en-US" altLang="ko-KR" dirty="0"/>
           </a:p>
           <a:p>
             <a:pPr>
@@ -5412,41 +5419,36 @@
               <a:buChar char="-"/>
             </a:pPr>
             <a:r>
-              <a:rPr lang="en-US" altLang="ko-KR" dirty="0" smtClean="0"/>
-              <a:t> </a:t>
-            </a:r>
-            <a:r>
-              <a:rPr lang="en-US" altLang="ko-KR" dirty="0" smtClean="0"/>
-              <a:t>growth</a:t>
-            </a:r>
-            <a:r>
-              <a:rPr lang="ko-KR" altLang="en-US" dirty="0" smtClean="0"/>
+              <a:rPr lang="en-US" altLang="ko-KR" dirty="0"/>
+              <a:t> growth</a:t>
+            </a:r>
+            <a:r>
+              <a:rPr lang="ko-KR" altLang="en-US" dirty="0"/>
               <a:t>가 일정 </a:t>
             </a:r>
             <a:r>
-              <a:rPr lang="en-US" altLang="ko-KR" dirty="0" err="1" smtClean="0"/>
+              <a:rPr lang="en-US" altLang="ko-KR" dirty="0" err="1"/>
               <a:t>growingPoint</a:t>
             </a:r>
             <a:r>
-              <a:rPr lang="ko-KR" altLang="en-US" dirty="0" smtClean="0"/>
+              <a:rPr lang="ko-KR" altLang="en-US" dirty="0"/>
               <a:t>에 도달하면 성장 레벨</a:t>
             </a:r>
             <a:r>
-              <a:rPr lang="en-US" altLang="ko-KR" dirty="0" smtClean="0"/>
+              <a:rPr lang="en-US" altLang="ko-KR" dirty="0"/>
               <a:t>(level)</a:t>
             </a:r>
             <a:r>
-              <a:rPr lang="ko-KR" altLang="en-US" dirty="0" smtClean="0"/>
+              <a:rPr lang="ko-KR" altLang="en-US" dirty="0"/>
               <a:t>을 증가시켜 성장을 시키는 메소드</a:t>
             </a:r>
-            <a:endParaRPr lang="ko-KR" altLang="en-US" dirty="0"/>
           </a:p>
         </p:txBody>
       </p:sp>
     </p:spTree>
     <p:extLst>
       <p:ext uri="{BB962C8B-B14F-4D97-AF65-F5344CB8AC3E}">
-        <p14:creationId xmlns:p14="http://schemas.microsoft.com/office/powerpoint/2010/main" xmlns="" val="2817074317"/>
+        <p14:creationId xmlns:p14="http://schemas.microsoft.com/office/powerpoint/2010/main" val="2817074317"/>
       </p:ext>
     </p:extLst>
   </p:cSld>
@@ -5478,7 +5480,7 @@
           <p:cNvPr id="5" name="화살표: 오각형 4">
             <a:extLst>
               <a:ext uri="{FF2B5EF4-FFF2-40B4-BE49-F238E27FC236}">
-                <a16:creationId xmlns:a16="http://schemas.microsoft.com/office/drawing/2014/main" xmlns="" id="{60CB682F-2A19-4CEF-A3E1-216C7EEDED57}"/>
+                <a16:creationId xmlns:a16="http://schemas.microsoft.com/office/drawing/2014/main" id="{60CB682F-2A19-4CEF-A3E1-216C7EEDED57}"/>
               </a:ext>
             </a:extLst>
           </p:cNvPr>
@@ -5568,7 +5570,7 @@
           <p:cNvPr id="44" name="화살표: 오각형 43">
             <a:extLst>
               <a:ext uri="{FF2B5EF4-FFF2-40B4-BE49-F238E27FC236}">
-                <a16:creationId xmlns:a16="http://schemas.microsoft.com/office/drawing/2014/main" xmlns="" id="{04816F70-07B5-4D18-B916-8209D5127598}"/>
+                <a16:creationId xmlns:a16="http://schemas.microsoft.com/office/drawing/2014/main" id="{04816F70-07B5-4D18-B916-8209D5127598}"/>
               </a:ext>
             </a:extLst>
           </p:cNvPr>
@@ -5653,7 +5655,7 @@
           <p:cNvPr id="45" name="화살표: 오각형 44">
             <a:extLst>
               <a:ext uri="{FF2B5EF4-FFF2-40B4-BE49-F238E27FC236}">
-                <a16:creationId xmlns:a16="http://schemas.microsoft.com/office/drawing/2014/main" xmlns="" id="{3EC874C2-AFE1-4DD5-BEEF-24D4BC3BD0F0}"/>
+                <a16:creationId xmlns:a16="http://schemas.microsoft.com/office/drawing/2014/main" id="{3EC874C2-AFE1-4DD5-BEEF-24D4BC3BD0F0}"/>
               </a:ext>
             </a:extLst>
           </p:cNvPr>
@@ -5738,7 +5740,7 @@
           <p:cNvPr id="7" name="화살표: 갈매기형 수장 6">
             <a:extLst>
               <a:ext uri="{FF2B5EF4-FFF2-40B4-BE49-F238E27FC236}">
-                <a16:creationId xmlns:a16="http://schemas.microsoft.com/office/drawing/2014/main" xmlns="" id="{18E3E5D6-743E-431A-ADA7-2A4272B99AAA}"/>
+                <a16:creationId xmlns:a16="http://schemas.microsoft.com/office/drawing/2014/main" id="{18E3E5D6-743E-431A-ADA7-2A4272B99AAA}"/>
               </a:ext>
             </a:extLst>
           </p:cNvPr>
@@ -5831,7 +5833,7 @@
           <p:cNvPr id="46" name="화살표: 갈매기형 수장 45">
             <a:extLst>
               <a:ext uri="{FF2B5EF4-FFF2-40B4-BE49-F238E27FC236}">
-                <a16:creationId xmlns:a16="http://schemas.microsoft.com/office/drawing/2014/main" xmlns="" id="{7CA0BD16-1215-4F8D-A617-21531F6775CA}"/>
+                <a16:creationId xmlns:a16="http://schemas.microsoft.com/office/drawing/2014/main" id="{7CA0BD16-1215-4F8D-A617-21531F6775CA}"/>
               </a:ext>
             </a:extLst>
           </p:cNvPr>
@@ -5920,7 +5922,7 @@
           <p:cNvPr id="47" name="화살표: 갈매기형 수장 46">
             <a:extLst>
               <a:ext uri="{FF2B5EF4-FFF2-40B4-BE49-F238E27FC236}">
-                <a16:creationId xmlns:a16="http://schemas.microsoft.com/office/drawing/2014/main" xmlns="" id="{04D139AD-9128-4B21-8081-BCC233F45505}"/>
+                <a16:creationId xmlns:a16="http://schemas.microsoft.com/office/drawing/2014/main" id="{04D139AD-9128-4B21-8081-BCC233F45505}"/>
               </a:ext>
             </a:extLst>
           </p:cNvPr>
@@ -6009,7 +6011,7 @@
           <p:cNvPr id="21" name="TextBox 20">
             <a:extLst>
               <a:ext uri="{FF2B5EF4-FFF2-40B4-BE49-F238E27FC236}">
-                <a16:creationId xmlns:a16="http://schemas.microsoft.com/office/drawing/2014/main" xmlns="" id="{4E88D7B6-4EF4-4FD5-8633-6B0AD3E51EC5}"/>
+                <a16:creationId xmlns:a16="http://schemas.microsoft.com/office/drawing/2014/main" id="{4E88D7B6-4EF4-4FD5-8633-6B0AD3E51EC5}"/>
               </a:ext>
             </a:extLst>
           </p:cNvPr>
@@ -6076,7 +6078,7 @@
           <p:cNvPr id="22" name="직선 연결선 21">
             <a:extLst>
               <a:ext uri="{FF2B5EF4-FFF2-40B4-BE49-F238E27FC236}">
-                <a16:creationId xmlns:a16="http://schemas.microsoft.com/office/drawing/2014/main" xmlns="" id="{CB1BEE3A-0038-435C-AE31-A9F88FAD67B6}"/>
+                <a16:creationId xmlns:a16="http://schemas.microsoft.com/office/drawing/2014/main" id="{CB1BEE3A-0038-435C-AE31-A9F88FAD67B6}"/>
               </a:ext>
             </a:extLst>
           </p:cNvPr>
@@ -6119,7 +6121,7 @@
           <p:cNvPr id="18" name="TextBox 17">
             <a:extLst>
               <a:ext uri="{FF2B5EF4-FFF2-40B4-BE49-F238E27FC236}">
-                <a16:creationId xmlns:a16="http://schemas.microsoft.com/office/drawing/2014/main" xmlns="" id="{0467B28E-52FD-411F-9380-25DEF240F3F3}"/>
+                <a16:creationId xmlns:a16="http://schemas.microsoft.com/office/drawing/2014/main" id="{0467B28E-52FD-411F-9380-25DEF240F3F3}"/>
               </a:ext>
             </a:extLst>
           </p:cNvPr>
@@ -6252,7 +6254,7 @@
           <p:cNvPr id="11" name="직선 연결선 10">
             <a:extLst>
               <a:ext uri="{FF2B5EF4-FFF2-40B4-BE49-F238E27FC236}">
-                <a16:creationId xmlns:a16="http://schemas.microsoft.com/office/drawing/2014/main" xmlns="" id="{806BE627-0E04-4AE4-8A3E-67A9BBBEE53A}"/>
+                <a16:creationId xmlns:a16="http://schemas.microsoft.com/office/drawing/2014/main" id="{806BE627-0E04-4AE4-8A3E-67A9BBBEE53A}"/>
               </a:ext>
             </a:extLst>
           </p:cNvPr>
@@ -6296,7 +6298,7 @@
           <p:cNvPr id="13" name="사각형: 둥근 모서리 12">
             <a:extLst>
               <a:ext uri="{FF2B5EF4-FFF2-40B4-BE49-F238E27FC236}">
-                <a16:creationId xmlns:a16="http://schemas.microsoft.com/office/drawing/2014/main" xmlns="" id="{A041AE87-B817-422F-98E2-F40911F8EA9C}"/>
+                <a16:creationId xmlns:a16="http://schemas.microsoft.com/office/drawing/2014/main" id="{A041AE87-B817-422F-98E2-F40911F8EA9C}"/>
               </a:ext>
             </a:extLst>
           </p:cNvPr>
@@ -6350,7 +6352,7 @@
           <p:cNvPr id="14" name="TextBox 13">
             <a:extLst>
               <a:ext uri="{FF2B5EF4-FFF2-40B4-BE49-F238E27FC236}">
-                <a16:creationId xmlns:a16="http://schemas.microsoft.com/office/drawing/2014/main" xmlns="" id="{4776D467-57BA-44B6-BBF2-FEF51EA21AC7}"/>
+                <a16:creationId xmlns:a16="http://schemas.microsoft.com/office/drawing/2014/main" id="{4776D467-57BA-44B6-BBF2-FEF51EA21AC7}"/>
               </a:ext>
             </a:extLst>
           </p:cNvPr>
@@ -6394,7 +6396,7 @@
           <p:cNvPr id="17" name="직선 연결선 16">
             <a:extLst>
               <a:ext uri="{FF2B5EF4-FFF2-40B4-BE49-F238E27FC236}">
-                <a16:creationId xmlns:a16="http://schemas.microsoft.com/office/drawing/2014/main" xmlns="" id="{D5E4058D-78C4-4AB6-BDD3-E3F69D277EC7}"/>
+                <a16:creationId xmlns:a16="http://schemas.microsoft.com/office/drawing/2014/main" id="{D5E4058D-78C4-4AB6-BDD3-E3F69D277EC7}"/>
               </a:ext>
             </a:extLst>
           </p:cNvPr>
@@ -6438,7 +6440,7 @@
           <p:cNvPr id="23" name="직선 연결선 22">
             <a:extLst>
               <a:ext uri="{FF2B5EF4-FFF2-40B4-BE49-F238E27FC236}">
-                <a16:creationId xmlns:a16="http://schemas.microsoft.com/office/drawing/2014/main" xmlns="" id="{C559DD7C-E1FA-4BB3-A346-96947CE64A90}"/>
+                <a16:creationId xmlns:a16="http://schemas.microsoft.com/office/drawing/2014/main" id="{C559DD7C-E1FA-4BB3-A346-96947CE64A90}"/>
               </a:ext>
             </a:extLst>
           </p:cNvPr>
@@ -6482,7 +6484,7 @@
           <p:cNvPr id="12" name="TextBox 11">
             <a:extLst>
               <a:ext uri="{FF2B5EF4-FFF2-40B4-BE49-F238E27FC236}">
-                <a16:creationId xmlns:a16="http://schemas.microsoft.com/office/drawing/2014/main" xmlns="" id="{F55B61A7-87D9-41AB-AB2B-27FECA6982D2}"/>
+                <a16:creationId xmlns:a16="http://schemas.microsoft.com/office/drawing/2014/main" id="{F55B61A7-87D9-41AB-AB2B-27FECA6982D2}"/>
               </a:ext>
             </a:extLst>
           </p:cNvPr>
@@ -6659,7 +6661,7 @@
     </p:spTree>
     <p:extLst>
       <p:ext uri="{BB962C8B-B14F-4D97-AF65-F5344CB8AC3E}">
-        <p14:creationId xmlns:p14="http://schemas.microsoft.com/office/powerpoint/2010/main" xmlns="" val="3274469358"/>
+        <p14:creationId xmlns:p14="http://schemas.microsoft.com/office/powerpoint/2010/main" val="3274469358"/>
       </p:ext>
     </p:extLst>
   </p:cSld>
@@ -6691,7 +6693,7 @@
           <p:cNvPr id="7" name="직사각형 6">
             <a:extLst>
               <a:ext uri="{FF2B5EF4-FFF2-40B4-BE49-F238E27FC236}">
-                <a16:creationId xmlns:a16="http://schemas.microsoft.com/office/drawing/2014/main" xmlns="" id="{47D87A93-BCA3-474C-B7F8-FDE2F40A3ECB}"/>
+                <a16:creationId xmlns:a16="http://schemas.microsoft.com/office/drawing/2014/main" id="{47D87A93-BCA3-474C-B7F8-FDE2F40A3ECB}"/>
               </a:ext>
             </a:extLst>
           </p:cNvPr>
@@ -6757,7 +6759,7 @@
           <p:cNvPr id="4" name="TextBox 3">
             <a:extLst>
               <a:ext uri="{FF2B5EF4-FFF2-40B4-BE49-F238E27FC236}">
-                <a16:creationId xmlns:a16="http://schemas.microsoft.com/office/drawing/2014/main" xmlns="" id="{2680B476-8CED-403A-88D7-96A2CAA2F7AB}"/>
+                <a16:creationId xmlns:a16="http://schemas.microsoft.com/office/drawing/2014/main" id="{2680B476-8CED-403A-88D7-96A2CAA2F7AB}"/>
               </a:ext>
             </a:extLst>
           </p:cNvPr>
@@ -6843,7 +6845,7 @@
           <p:cNvPr id="14" name="TextBox 13">
             <a:extLst>
               <a:ext uri="{FF2B5EF4-FFF2-40B4-BE49-F238E27FC236}">
-                <a16:creationId xmlns:a16="http://schemas.microsoft.com/office/drawing/2014/main" xmlns="" id="{59F1228D-436C-437F-8AE5-657282A0A558}"/>
+                <a16:creationId xmlns:a16="http://schemas.microsoft.com/office/drawing/2014/main" id="{59F1228D-436C-437F-8AE5-657282A0A558}"/>
               </a:ext>
             </a:extLst>
           </p:cNvPr>
@@ -6924,7 +6926,7 @@
           <p:cNvPr id="20" name="말풍선: 모서리가 둥근 사각형 19">
             <a:extLst>
               <a:ext uri="{FF2B5EF4-FFF2-40B4-BE49-F238E27FC236}">
-                <a16:creationId xmlns:a16="http://schemas.microsoft.com/office/drawing/2014/main" xmlns="" id="{DCA31AB8-323B-4DAB-A928-163CB1704A58}"/>
+                <a16:creationId xmlns:a16="http://schemas.microsoft.com/office/drawing/2014/main" id="{DCA31AB8-323B-4DAB-A928-163CB1704A58}"/>
               </a:ext>
             </a:extLst>
           </p:cNvPr>
@@ -6993,7 +6995,7 @@
           <p:cNvPr id="37" name="그룹 36">
             <a:extLst>
               <a:ext uri="{FF2B5EF4-FFF2-40B4-BE49-F238E27FC236}">
-                <a16:creationId xmlns:a16="http://schemas.microsoft.com/office/drawing/2014/main" xmlns="" id="{627B52D8-1239-4A23-B5ED-C6DF68AA2C02}"/>
+                <a16:creationId xmlns:a16="http://schemas.microsoft.com/office/drawing/2014/main" id="{627B52D8-1239-4A23-B5ED-C6DF68AA2C02}"/>
               </a:ext>
             </a:extLst>
           </p:cNvPr>
@@ -7013,7 +7015,7 @@
             <p:cNvPr id="21" name="타원 20">
               <a:extLst>
                 <a:ext uri="{FF2B5EF4-FFF2-40B4-BE49-F238E27FC236}">
-                  <a16:creationId xmlns:a16="http://schemas.microsoft.com/office/drawing/2014/main" xmlns="" id="{13D8C323-C277-486E-9570-872B45782206}"/>
+                  <a16:creationId xmlns:a16="http://schemas.microsoft.com/office/drawing/2014/main" id="{13D8C323-C277-486E-9570-872B45782206}"/>
                 </a:ext>
               </a:extLst>
             </p:cNvPr>
@@ -7065,7 +7067,7 @@
             <p:cNvPr id="22" name="타원 21">
               <a:extLst>
                 <a:ext uri="{FF2B5EF4-FFF2-40B4-BE49-F238E27FC236}">
-                  <a16:creationId xmlns:a16="http://schemas.microsoft.com/office/drawing/2014/main" xmlns="" id="{12CEA177-6AFF-47B2-9077-4C917E71C238}"/>
+                  <a16:creationId xmlns:a16="http://schemas.microsoft.com/office/drawing/2014/main" id="{12CEA177-6AFF-47B2-9077-4C917E71C238}"/>
                 </a:ext>
               </a:extLst>
             </p:cNvPr>
@@ -7117,7 +7119,7 @@
             <p:cNvPr id="23" name="타원 22">
               <a:extLst>
                 <a:ext uri="{FF2B5EF4-FFF2-40B4-BE49-F238E27FC236}">
-                  <a16:creationId xmlns:a16="http://schemas.microsoft.com/office/drawing/2014/main" xmlns="" id="{41EF5D07-484C-409A-9E81-EE8D4155AAB6}"/>
+                  <a16:creationId xmlns:a16="http://schemas.microsoft.com/office/drawing/2014/main" id="{41EF5D07-484C-409A-9E81-EE8D4155AAB6}"/>
                 </a:ext>
               </a:extLst>
             </p:cNvPr>
@@ -7169,7 +7171,7 @@
             <p:cNvPr id="27" name="직선 연결선 26">
               <a:extLst>
                 <a:ext uri="{FF2B5EF4-FFF2-40B4-BE49-F238E27FC236}">
-                  <a16:creationId xmlns:a16="http://schemas.microsoft.com/office/drawing/2014/main" xmlns="" id="{1D3FAABC-AA7C-4AA2-8352-12D15842E222}"/>
+                  <a16:creationId xmlns:a16="http://schemas.microsoft.com/office/drawing/2014/main" id="{1D3FAABC-AA7C-4AA2-8352-12D15842E222}"/>
                 </a:ext>
               </a:extLst>
             </p:cNvPr>
@@ -7213,7 +7215,7 @@
             <p:cNvPr id="28" name="직선 연결선 27">
               <a:extLst>
                 <a:ext uri="{FF2B5EF4-FFF2-40B4-BE49-F238E27FC236}">
-                  <a16:creationId xmlns:a16="http://schemas.microsoft.com/office/drawing/2014/main" xmlns="" id="{E8593AA4-4F6B-43FD-9EF5-E4A7792DE356}"/>
+                  <a16:creationId xmlns:a16="http://schemas.microsoft.com/office/drawing/2014/main" id="{E8593AA4-4F6B-43FD-9EF5-E4A7792DE356}"/>
                 </a:ext>
               </a:extLst>
             </p:cNvPr>
@@ -7258,7 +7260,7 @@
           <p:cNvPr id="38" name="그룹 37">
             <a:extLst>
               <a:ext uri="{FF2B5EF4-FFF2-40B4-BE49-F238E27FC236}">
-                <a16:creationId xmlns:a16="http://schemas.microsoft.com/office/drawing/2014/main" xmlns="" id="{8232BE26-AE4D-4540-A2C6-F0277CE0582F}"/>
+                <a16:creationId xmlns:a16="http://schemas.microsoft.com/office/drawing/2014/main" id="{8232BE26-AE4D-4540-A2C6-F0277CE0582F}"/>
               </a:ext>
             </a:extLst>
           </p:cNvPr>
@@ -7278,7 +7280,7 @@
             <p:cNvPr id="30" name="하트 29">
               <a:extLst>
                 <a:ext uri="{FF2B5EF4-FFF2-40B4-BE49-F238E27FC236}">
-                  <a16:creationId xmlns:a16="http://schemas.microsoft.com/office/drawing/2014/main" xmlns="" id="{7D882461-DBFD-4F62-8971-BE379791647A}"/>
+                  <a16:creationId xmlns:a16="http://schemas.microsoft.com/office/drawing/2014/main" id="{7D882461-DBFD-4F62-8971-BE379791647A}"/>
                 </a:ext>
               </a:extLst>
             </p:cNvPr>
@@ -7330,7 +7332,7 @@
             <p:cNvPr id="31" name="하트 30">
               <a:extLst>
                 <a:ext uri="{FF2B5EF4-FFF2-40B4-BE49-F238E27FC236}">
-                  <a16:creationId xmlns:a16="http://schemas.microsoft.com/office/drawing/2014/main" xmlns="" id="{F20160CC-56FA-4C00-B8FA-CB5A097AED5F}"/>
+                  <a16:creationId xmlns:a16="http://schemas.microsoft.com/office/drawing/2014/main" id="{F20160CC-56FA-4C00-B8FA-CB5A097AED5F}"/>
                 </a:ext>
               </a:extLst>
             </p:cNvPr>
@@ -7382,7 +7384,7 @@
             <p:cNvPr id="32" name="하트 31">
               <a:extLst>
                 <a:ext uri="{FF2B5EF4-FFF2-40B4-BE49-F238E27FC236}">
-                  <a16:creationId xmlns:a16="http://schemas.microsoft.com/office/drawing/2014/main" xmlns="" id="{41D7C195-4EC4-4E3A-BDDB-6B6B2585EA4D}"/>
+                  <a16:creationId xmlns:a16="http://schemas.microsoft.com/office/drawing/2014/main" id="{41D7C195-4EC4-4E3A-BDDB-6B6B2585EA4D}"/>
                 </a:ext>
               </a:extLst>
             </p:cNvPr>
@@ -7435,7 +7437,7 @@
           <p:cNvPr id="46" name="그룹 45">
             <a:extLst>
               <a:ext uri="{FF2B5EF4-FFF2-40B4-BE49-F238E27FC236}">
-                <a16:creationId xmlns:a16="http://schemas.microsoft.com/office/drawing/2014/main" xmlns="" id="{6DA0FEFD-A7B7-4682-9D6E-EBF402E1E07F}"/>
+                <a16:creationId xmlns:a16="http://schemas.microsoft.com/office/drawing/2014/main" id="{6DA0FEFD-A7B7-4682-9D6E-EBF402E1E07F}"/>
               </a:ext>
             </a:extLst>
           </p:cNvPr>
@@ -7455,7 +7457,7 @@
             <p:cNvPr id="9" name="사각형: 둥근 모서리 8">
               <a:extLst>
                 <a:ext uri="{FF2B5EF4-FFF2-40B4-BE49-F238E27FC236}">
-                  <a16:creationId xmlns:a16="http://schemas.microsoft.com/office/drawing/2014/main" xmlns="" id="{BEBD7B1B-842C-48C2-A039-0924B58DCAD1}"/>
+                  <a16:creationId xmlns:a16="http://schemas.microsoft.com/office/drawing/2014/main" id="{BEBD7B1B-842C-48C2-A039-0924B58DCAD1}"/>
                 </a:ext>
               </a:extLst>
             </p:cNvPr>
@@ -7512,7 +7514,7 @@
             <p:cNvPr id="10" name="직사각형 9">
               <a:extLst>
                 <a:ext uri="{FF2B5EF4-FFF2-40B4-BE49-F238E27FC236}">
-                  <a16:creationId xmlns:a16="http://schemas.microsoft.com/office/drawing/2014/main" xmlns="" id="{BC282A83-383B-46C1-A764-CED414A0E866}"/>
+                  <a16:creationId xmlns:a16="http://schemas.microsoft.com/office/drawing/2014/main" id="{BC282A83-383B-46C1-A764-CED414A0E866}"/>
                 </a:ext>
               </a:extLst>
             </p:cNvPr>
@@ -7561,7 +7563,7 @@
             <p:cNvPr id="44" name="직선 연결선 43">
               <a:extLst>
                 <a:ext uri="{FF2B5EF4-FFF2-40B4-BE49-F238E27FC236}">
-                  <a16:creationId xmlns:a16="http://schemas.microsoft.com/office/drawing/2014/main" xmlns="" id="{31B2AD8F-81FA-4DE8-B186-CA2D7193D702}"/>
+                  <a16:creationId xmlns:a16="http://schemas.microsoft.com/office/drawing/2014/main" id="{31B2AD8F-81FA-4DE8-B186-CA2D7193D702}"/>
                 </a:ext>
               </a:extLst>
             </p:cNvPr>
@@ -7605,7 +7607,7 @@
           <p:cNvPr id="47" name="화살표: 위쪽 46">
             <a:extLst>
               <a:ext uri="{FF2B5EF4-FFF2-40B4-BE49-F238E27FC236}">
-                <a16:creationId xmlns:a16="http://schemas.microsoft.com/office/drawing/2014/main" xmlns="" id="{5210DE9F-86E4-4D41-A330-31FF540DA06C}"/>
+                <a16:creationId xmlns:a16="http://schemas.microsoft.com/office/drawing/2014/main" id="{5210DE9F-86E4-4D41-A330-31FF540DA06C}"/>
               </a:ext>
             </a:extLst>
           </p:cNvPr>
@@ -7659,7 +7661,7 @@
           <p:cNvPr id="33" name="말풍선: 모서리가 둥근 사각형 32">
             <a:extLst>
               <a:ext uri="{FF2B5EF4-FFF2-40B4-BE49-F238E27FC236}">
-                <a16:creationId xmlns:a16="http://schemas.microsoft.com/office/drawing/2014/main" xmlns="" id="{F46F9A5D-AAA8-495A-8F6D-B4294154B18E}"/>
+                <a16:creationId xmlns:a16="http://schemas.microsoft.com/office/drawing/2014/main" id="{F46F9A5D-AAA8-495A-8F6D-B4294154B18E}"/>
               </a:ext>
             </a:extLst>
           </p:cNvPr>
@@ -7756,7 +7758,7 @@
           <p:cNvPr id="34" name="말풍선: 모서리가 둥근 사각형 33">
             <a:extLst>
               <a:ext uri="{FF2B5EF4-FFF2-40B4-BE49-F238E27FC236}">
-                <a16:creationId xmlns:a16="http://schemas.microsoft.com/office/drawing/2014/main" xmlns="" id="{F5A3B3E4-B900-4C4F-918C-6FC5522B4733}"/>
+                <a16:creationId xmlns:a16="http://schemas.microsoft.com/office/drawing/2014/main" id="{F5A3B3E4-B900-4C4F-918C-6FC5522B4733}"/>
               </a:ext>
             </a:extLst>
           </p:cNvPr>
@@ -7825,7 +7827,7 @@
           <p:cNvPr id="36" name="TextBox 35">
             <a:extLst>
               <a:ext uri="{FF2B5EF4-FFF2-40B4-BE49-F238E27FC236}">
-                <a16:creationId xmlns:a16="http://schemas.microsoft.com/office/drawing/2014/main" xmlns="" id="{A1C2E8A9-9681-42CF-9C56-0B0616976672}"/>
+                <a16:creationId xmlns:a16="http://schemas.microsoft.com/office/drawing/2014/main" id="{A1C2E8A9-9681-42CF-9C56-0B0616976672}"/>
               </a:ext>
             </a:extLst>
           </p:cNvPr>
@@ -7880,7 +7882,7 @@
     </p:spTree>
     <p:extLst>
       <p:ext uri="{BB962C8B-B14F-4D97-AF65-F5344CB8AC3E}">
-        <p14:creationId xmlns:p14="http://schemas.microsoft.com/office/powerpoint/2010/main" xmlns="" val="1850375427"/>
+        <p14:creationId xmlns:p14="http://schemas.microsoft.com/office/powerpoint/2010/main" val="1850375427"/>
       </p:ext>
     </p:extLst>
   </p:cSld>
@@ -7912,7 +7914,7 @@
           <p:cNvPr id="7" name="직사각형 6">
             <a:extLst>
               <a:ext uri="{FF2B5EF4-FFF2-40B4-BE49-F238E27FC236}">
-                <a16:creationId xmlns:a16="http://schemas.microsoft.com/office/drawing/2014/main" xmlns="" id="{47D87A93-BCA3-474C-B7F8-FDE2F40A3ECB}"/>
+                <a16:creationId xmlns:a16="http://schemas.microsoft.com/office/drawing/2014/main" id="{47D87A93-BCA3-474C-B7F8-FDE2F40A3ECB}"/>
               </a:ext>
             </a:extLst>
           </p:cNvPr>
@@ -7968,7 +7970,7 @@
           <p:cNvPr id="77" name="TextBox 76">
             <a:extLst>
               <a:ext uri="{FF2B5EF4-FFF2-40B4-BE49-F238E27FC236}">
-                <a16:creationId xmlns:a16="http://schemas.microsoft.com/office/drawing/2014/main" xmlns="" id="{7C68B99C-223F-4517-BA47-D1DD3D7111C2}"/>
+                <a16:creationId xmlns:a16="http://schemas.microsoft.com/office/drawing/2014/main" id="{7C68B99C-223F-4517-BA47-D1DD3D7111C2}"/>
               </a:ext>
             </a:extLst>
           </p:cNvPr>
@@ -8013,7 +8015,7 @@
           <p:cNvPr id="80" name="TextBox 79">
             <a:extLst>
               <a:ext uri="{FF2B5EF4-FFF2-40B4-BE49-F238E27FC236}">
-                <a16:creationId xmlns:a16="http://schemas.microsoft.com/office/drawing/2014/main" xmlns="" id="{ADF95DEA-1C66-4516-950B-2F3FD0A75DE0}"/>
+                <a16:creationId xmlns:a16="http://schemas.microsoft.com/office/drawing/2014/main" id="{ADF95DEA-1C66-4516-950B-2F3FD0A75DE0}"/>
               </a:ext>
             </a:extLst>
           </p:cNvPr>
@@ -8146,7 +8148,7 @@
           <p:cNvPr id="49" name="직선 연결선 48">
             <a:extLst>
               <a:ext uri="{FF2B5EF4-FFF2-40B4-BE49-F238E27FC236}">
-                <a16:creationId xmlns:a16="http://schemas.microsoft.com/office/drawing/2014/main" xmlns="" id="{C9BA4F99-8255-456B-A11A-C6DF18C986AC}"/>
+                <a16:creationId xmlns:a16="http://schemas.microsoft.com/office/drawing/2014/main" id="{C9BA4F99-8255-456B-A11A-C6DF18C986AC}"/>
               </a:ext>
             </a:extLst>
           </p:cNvPr>
@@ -8189,7 +8191,7 @@
           <p:cNvPr id="51" name="말풍선: 모서리가 둥근 사각형 50">
             <a:extLst>
               <a:ext uri="{FF2B5EF4-FFF2-40B4-BE49-F238E27FC236}">
-                <a16:creationId xmlns:a16="http://schemas.microsoft.com/office/drawing/2014/main" xmlns="" id="{BF2921AF-A099-491C-B2E6-1A70DD695215}"/>
+                <a16:creationId xmlns:a16="http://schemas.microsoft.com/office/drawing/2014/main" id="{BF2921AF-A099-491C-B2E6-1A70DD695215}"/>
               </a:ext>
             </a:extLst>
           </p:cNvPr>
@@ -8264,7 +8266,7 @@
           <p:cNvPr id="60" name="말풍선: 모서리가 둥근 사각형 59">
             <a:extLst>
               <a:ext uri="{FF2B5EF4-FFF2-40B4-BE49-F238E27FC236}">
-                <a16:creationId xmlns:a16="http://schemas.microsoft.com/office/drawing/2014/main" xmlns="" id="{822E2E57-17CC-4648-9CCC-007CC49D9C70}"/>
+                <a16:creationId xmlns:a16="http://schemas.microsoft.com/office/drawing/2014/main" id="{822E2E57-17CC-4648-9CCC-007CC49D9C70}"/>
               </a:ext>
             </a:extLst>
           </p:cNvPr>
@@ -8359,7 +8361,7 @@
           <p:cNvPr id="67" name="말풍선: 모서리가 둥근 사각형 66">
             <a:extLst>
               <a:ext uri="{FF2B5EF4-FFF2-40B4-BE49-F238E27FC236}">
-                <a16:creationId xmlns:a16="http://schemas.microsoft.com/office/drawing/2014/main" xmlns="" id="{CD4BBD3F-F498-4F49-9223-789E0EC2A5DF}"/>
+                <a16:creationId xmlns:a16="http://schemas.microsoft.com/office/drawing/2014/main" id="{CD4BBD3F-F498-4F49-9223-789E0EC2A5DF}"/>
               </a:ext>
             </a:extLst>
           </p:cNvPr>
@@ -8451,7 +8453,7 @@
           <p:cNvPr id="68" name="타원 67">
             <a:extLst>
               <a:ext uri="{FF2B5EF4-FFF2-40B4-BE49-F238E27FC236}">
-                <a16:creationId xmlns:a16="http://schemas.microsoft.com/office/drawing/2014/main" xmlns="" id="{47380EDF-F6D8-40A8-8E86-929BD7735EB3}"/>
+                <a16:creationId xmlns:a16="http://schemas.microsoft.com/office/drawing/2014/main" id="{47380EDF-F6D8-40A8-8E86-929BD7735EB3}"/>
               </a:ext>
             </a:extLst>
           </p:cNvPr>
@@ -8503,7 +8505,7 @@
           <p:cNvPr id="70" name="타원 69">
             <a:extLst>
               <a:ext uri="{FF2B5EF4-FFF2-40B4-BE49-F238E27FC236}">
-                <a16:creationId xmlns:a16="http://schemas.microsoft.com/office/drawing/2014/main" xmlns="" id="{8DFD3744-8CFB-42E8-817F-69D67E66ED2C}"/>
+                <a16:creationId xmlns:a16="http://schemas.microsoft.com/office/drawing/2014/main" id="{8DFD3744-8CFB-42E8-817F-69D67E66ED2C}"/>
               </a:ext>
             </a:extLst>
           </p:cNvPr>
@@ -8555,7 +8557,7 @@
           <p:cNvPr id="74" name="타원 73">
             <a:extLst>
               <a:ext uri="{FF2B5EF4-FFF2-40B4-BE49-F238E27FC236}">
-                <a16:creationId xmlns:a16="http://schemas.microsoft.com/office/drawing/2014/main" xmlns="" id="{07F85206-3F27-4EDC-9B68-E09D543B346C}"/>
+                <a16:creationId xmlns:a16="http://schemas.microsoft.com/office/drawing/2014/main" id="{07F85206-3F27-4EDC-9B68-E09D543B346C}"/>
               </a:ext>
             </a:extLst>
           </p:cNvPr>
@@ -8607,7 +8609,7 @@
           <p:cNvPr id="23" name="말풍선: 모서리가 둥근 사각형 22">
             <a:extLst>
               <a:ext uri="{FF2B5EF4-FFF2-40B4-BE49-F238E27FC236}">
-                <a16:creationId xmlns:a16="http://schemas.microsoft.com/office/drawing/2014/main" xmlns="" id="{DD1F4102-3BD7-4B68-975F-4730C5B46AF2}"/>
+                <a16:creationId xmlns:a16="http://schemas.microsoft.com/office/drawing/2014/main" id="{DD1F4102-3BD7-4B68-975F-4730C5B46AF2}"/>
               </a:ext>
             </a:extLst>
           </p:cNvPr>
@@ -8759,7 +8761,7 @@
           <p:cNvPr id="24" name="타원 23">
             <a:extLst>
               <a:ext uri="{FF2B5EF4-FFF2-40B4-BE49-F238E27FC236}">
-                <a16:creationId xmlns:a16="http://schemas.microsoft.com/office/drawing/2014/main" xmlns="" id="{3F1D8D3B-5EF2-4DA9-9D5C-19F63EB26C06}"/>
+                <a16:creationId xmlns:a16="http://schemas.microsoft.com/office/drawing/2014/main" id="{3F1D8D3B-5EF2-4DA9-9D5C-19F63EB26C06}"/>
               </a:ext>
             </a:extLst>
           </p:cNvPr>
@@ -8809,7 +8811,7 @@
     </p:spTree>
     <p:extLst>
       <p:ext uri="{BB962C8B-B14F-4D97-AF65-F5344CB8AC3E}">
-        <p14:creationId xmlns:p14="http://schemas.microsoft.com/office/powerpoint/2010/main" xmlns="" val="1225441807"/>
+        <p14:creationId xmlns:p14="http://schemas.microsoft.com/office/powerpoint/2010/main" val="1225441807"/>
       </p:ext>
     </p:extLst>
   </p:cSld>
@@ -8841,7 +8843,7 @@
           <p:cNvPr id="24" name="TextBox 23">
             <a:extLst>
               <a:ext uri="{FF2B5EF4-FFF2-40B4-BE49-F238E27FC236}">
-                <a16:creationId xmlns:a16="http://schemas.microsoft.com/office/drawing/2014/main" xmlns="" id="{C192902B-DD11-4AC2-839C-26EF563296A5}"/>
+                <a16:creationId xmlns:a16="http://schemas.microsoft.com/office/drawing/2014/main" id="{C192902B-DD11-4AC2-839C-26EF563296A5}"/>
               </a:ext>
             </a:extLst>
           </p:cNvPr>
@@ -8881,7 +8883,7 @@
           <p:cNvPr id="27" name="TextBox 26">
             <a:extLst>
               <a:ext uri="{FF2B5EF4-FFF2-40B4-BE49-F238E27FC236}">
-                <a16:creationId xmlns:a16="http://schemas.microsoft.com/office/drawing/2014/main" xmlns="" id="{3C38130C-C0F2-454D-ADC3-88052BBAB4D7}"/>
+                <a16:creationId xmlns:a16="http://schemas.microsoft.com/office/drawing/2014/main" id="{3C38130C-C0F2-454D-ADC3-88052BBAB4D7}"/>
               </a:ext>
             </a:extLst>
           </p:cNvPr>
@@ -9376,7 +9378,7 @@
           <p:cNvPr id="28" name="직사각형 27">
             <a:extLst>
               <a:ext uri="{FF2B5EF4-FFF2-40B4-BE49-F238E27FC236}">
-                <a16:creationId xmlns:a16="http://schemas.microsoft.com/office/drawing/2014/main" xmlns="" id="{8B3A6F1F-8CA4-42F9-B6C4-EEAE6F1B2731}"/>
+                <a16:creationId xmlns:a16="http://schemas.microsoft.com/office/drawing/2014/main" id="{8B3A6F1F-8CA4-42F9-B6C4-EEAE6F1B2731}"/>
               </a:ext>
             </a:extLst>
           </p:cNvPr>
@@ -9723,7 +9725,7 @@
           <p:cNvPr id="4" name="이등변 삼각형 3">
             <a:extLst>
               <a:ext uri="{FF2B5EF4-FFF2-40B4-BE49-F238E27FC236}">
-                <a16:creationId xmlns:a16="http://schemas.microsoft.com/office/drawing/2014/main" xmlns="" id="{73232035-6576-4427-B3B8-6CA0E251C81F}"/>
+                <a16:creationId xmlns:a16="http://schemas.microsoft.com/office/drawing/2014/main" id="{73232035-6576-4427-B3B8-6CA0E251C81F}"/>
               </a:ext>
             </a:extLst>
           </p:cNvPr>
@@ -9775,7 +9777,7 @@
           <p:cNvPr id="30" name="TextBox 29">
             <a:extLst>
               <a:ext uri="{FF2B5EF4-FFF2-40B4-BE49-F238E27FC236}">
-                <a16:creationId xmlns:a16="http://schemas.microsoft.com/office/drawing/2014/main" xmlns="" id="{AB3DD259-4FB4-4FE6-8D41-2286D2E4957A}"/>
+                <a16:creationId xmlns:a16="http://schemas.microsoft.com/office/drawing/2014/main" id="{AB3DD259-4FB4-4FE6-8D41-2286D2E4957A}"/>
               </a:ext>
             </a:extLst>
           </p:cNvPr>
@@ -9824,7 +9826,7 @@
           <p:cNvPr id="6" name="직선 연결선 5">
             <a:extLst>
               <a:ext uri="{FF2B5EF4-FFF2-40B4-BE49-F238E27FC236}">
-                <a16:creationId xmlns:a16="http://schemas.microsoft.com/office/drawing/2014/main" xmlns="" id="{9A62C4C2-C58E-48DC-BF06-6096B50D0692}"/>
+                <a16:creationId xmlns:a16="http://schemas.microsoft.com/office/drawing/2014/main" id="{9A62C4C2-C58E-48DC-BF06-6096B50D0692}"/>
               </a:ext>
             </a:extLst>
           </p:cNvPr>
@@ -9867,7 +9869,7 @@
           <p:cNvPr id="10" name="TextBox 9">
             <a:extLst>
               <a:ext uri="{FF2B5EF4-FFF2-40B4-BE49-F238E27FC236}">
-                <a16:creationId xmlns:a16="http://schemas.microsoft.com/office/drawing/2014/main" xmlns="" id="{D27DB038-FBEA-4207-9879-005A66254826}"/>
+                <a16:creationId xmlns:a16="http://schemas.microsoft.com/office/drawing/2014/main" id="{D27DB038-FBEA-4207-9879-005A66254826}"/>
               </a:ext>
             </a:extLst>
           </p:cNvPr>
@@ -10000,7 +10002,7 @@
           <p:cNvPr id="2" name="TextBox 1">
             <a:extLst>
               <a:ext uri="{FF2B5EF4-FFF2-40B4-BE49-F238E27FC236}">
-                <a16:creationId xmlns:a16="http://schemas.microsoft.com/office/drawing/2014/main" xmlns="" id="{52BAA63B-1F1C-4149-A9D5-B40099DEA11F}"/>
+                <a16:creationId xmlns:a16="http://schemas.microsoft.com/office/drawing/2014/main" id="{52BAA63B-1F1C-4149-A9D5-B40099DEA11F}"/>
               </a:ext>
             </a:extLst>
           </p:cNvPr>
@@ -10036,7 +10038,7 @@
           <p:cNvPr id="5" name="그림 4" descr="나무이(가) 표시된 사진&#10;&#10;자동 생성된 설명">
             <a:extLst>
               <a:ext uri="{FF2B5EF4-FFF2-40B4-BE49-F238E27FC236}">
-                <a16:creationId xmlns:a16="http://schemas.microsoft.com/office/drawing/2014/main" xmlns="" id="{E2DC5056-6AC7-4BB9-8ED1-E1CBDE3BD2C5}"/>
+                <a16:creationId xmlns:a16="http://schemas.microsoft.com/office/drawing/2014/main" id="{E2DC5056-6AC7-4BB9-8ED1-E1CBDE3BD2C5}"/>
               </a:ext>
             </a:extLst>
           </p:cNvPr>
@@ -10049,7 +10051,7 @@
           <a:blip r:embed="rId2" cstate="print">
             <a:extLst>
               <a:ext uri="{28A0092B-C50C-407E-A947-70E740481C1C}">
-                <a14:useLocalDpi xmlns:a14="http://schemas.microsoft.com/office/drawing/2010/main" xmlns="" val="0"/>
+                <a14:useLocalDpi xmlns:a14="http://schemas.microsoft.com/office/drawing/2010/main" val="0"/>
               </a:ext>
             </a:extLst>
           </a:blip>
@@ -10070,7 +10072,7 @@
     </p:spTree>
     <p:extLst>
       <p:ext uri="{BB962C8B-B14F-4D97-AF65-F5344CB8AC3E}">
-        <p14:creationId xmlns:p14="http://schemas.microsoft.com/office/powerpoint/2010/main" xmlns="" val="634399566"/>
+        <p14:creationId xmlns:p14="http://schemas.microsoft.com/office/powerpoint/2010/main" val="634399566"/>
       </p:ext>
     </p:extLst>
   </p:cSld>
@@ -10102,7 +10104,7 @@
           <p:cNvPr id="18" name="TextBox 17">
             <a:extLst>
               <a:ext uri="{FF2B5EF4-FFF2-40B4-BE49-F238E27FC236}">
-                <a16:creationId xmlns:a16="http://schemas.microsoft.com/office/drawing/2014/main" xmlns="" id="{F5F14033-159A-4F0C-B61C-B8C735FEE171}"/>
+                <a16:creationId xmlns:a16="http://schemas.microsoft.com/office/drawing/2014/main" id="{F5F14033-159A-4F0C-B61C-B8C735FEE171}"/>
               </a:ext>
             </a:extLst>
           </p:cNvPr>
@@ -10134,7 +10136,7 @@
           <p:cNvPr id="25" name="TextBox 24">
             <a:extLst>
               <a:ext uri="{FF2B5EF4-FFF2-40B4-BE49-F238E27FC236}">
-                <a16:creationId xmlns:a16="http://schemas.microsoft.com/office/drawing/2014/main" xmlns="" id="{568AB5D6-1E95-4368-BFFD-4CAE6BB5A2CA}"/>
+                <a16:creationId xmlns:a16="http://schemas.microsoft.com/office/drawing/2014/main" id="{568AB5D6-1E95-4368-BFFD-4CAE6BB5A2CA}"/>
               </a:ext>
             </a:extLst>
           </p:cNvPr>
@@ -10193,7 +10195,7 @@
           <p:cNvPr id="21" name="TextBox 20">
             <a:extLst>
               <a:ext uri="{FF2B5EF4-FFF2-40B4-BE49-F238E27FC236}">
-                <a16:creationId xmlns:a16="http://schemas.microsoft.com/office/drawing/2014/main" xmlns="" id="{567D5619-369F-4A0A-898B-7C930DF358FE}"/>
+                <a16:creationId xmlns:a16="http://schemas.microsoft.com/office/drawing/2014/main" id="{567D5619-369F-4A0A-898B-7C930DF358FE}"/>
               </a:ext>
             </a:extLst>
           </p:cNvPr>
@@ -10236,7 +10238,7 @@
           <p:cNvPr id="22" name="직선 연결선 21">
             <a:extLst>
               <a:ext uri="{FF2B5EF4-FFF2-40B4-BE49-F238E27FC236}">
-                <a16:creationId xmlns:a16="http://schemas.microsoft.com/office/drawing/2014/main" xmlns="" id="{4C6588A3-D7E4-44C0-97A7-5631239F85E7}"/>
+                <a16:creationId xmlns:a16="http://schemas.microsoft.com/office/drawing/2014/main" id="{4C6588A3-D7E4-44C0-97A7-5631239F85E7}"/>
               </a:ext>
             </a:extLst>
           </p:cNvPr>
@@ -10279,7 +10281,7 @@
           <p:cNvPr id="37" name="TextBox 36">
             <a:extLst>
               <a:ext uri="{FF2B5EF4-FFF2-40B4-BE49-F238E27FC236}">
-                <a16:creationId xmlns:a16="http://schemas.microsoft.com/office/drawing/2014/main" xmlns="" id="{682C0FB3-D54A-4E33-9378-373D7D7FC601}"/>
+                <a16:creationId xmlns:a16="http://schemas.microsoft.com/office/drawing/2014/main" id="{682C0FB3-D54A-4E33-9378-373D7D7FC601}"/>
               </a:ext>
             </a:extLst>
           </p:cNvPr>
@@ -10412,7 +10414,7 @@
           <p:cNvPr id="8" name="화살표: 위쪽 7">
             <a:extLst>
               <a:ext uri="{FF2B5EF4-FFF2-40B4-BE49-F238E27FC236}">
-                <a16:creationId xmlns:a16="http://schemas.microsoft.com/office/drawing/2014/main" xmlns="" id="{130BD333-F978-4CA3-9785-C51C1DB295EE}"/>
+                <a16:creationId xmlns:a16="http://schemas.microsoft.com/office/drawing/2014/main" id="{130BD333-F978-4CA3-9785-C51C1DB295EE}"/>
               </a:ext>
             </a:extLst>
           </p:cNvPr>
@@ -10464,7 +10466,7 @@
           <p:cNvPr id="5" name="그룹 4">
             <a:extLst>
               <a:ext uri="{FF2B5EF4-FFF2-40B4-BE49-F238E27FC236}">
-                <a16:creationId xmlns:a16="http://schemas.microsoft.com/office/drawing/2014/main" xmlns="" id="{9C01A675-4527-4A83-8330-765C9EC4F9B0}"/>
+                <a16:creationId xmlns:a16="http://schemas.microsoft.com/office/drawing/2014/main" id="{9C01A675-4527-4A83-8330-765C9EC4F9B0}"/>
               </a:ext>
             </a:extLst>
           </p:cNvPr>
@@ -10484,7 +10486,7 @@
             <p:cNvPr id="39" name="직선 연결선 38">
               <a:extLst>
                 <a:ext uri="{FF2B5EF4-FFF2-40B4-BE49-F238E27FC236}">
-                  <a16:creationId xmlns:a16="http://schemas.microsoft.com/office/drawing/2014/main" xmlns="" id="{0984545E-69ED-49E3-AA7A-EEB4AEB089C6}"/>
+                  <a16:creationId xmlns:a16="http://schemas.microsoft.com/office/drawing/2014/main" id="{0984545E-69ED-49E3-AA7A-EEB4AEB089C6}"/>
                 </a:ext>
               </a:extLst>
             </p:cNvPr>
@@ -10527,7 +10529,7 @@
             <p:cNvPr id="27" name="화살표: 오각형 26">
               <a:extLst>
                 <a:ext uri="{FF2B5EF4-FFF2-40B4-BE49-F238E27FC236}">
-                  <a16:creationId xmlns:a16="http://schemas.microsoft.com/office/drawing/2014/main" xmlns="" id="{5CB9A663-7921-4F7A-AFCD-C844C63E34C0}"/>
+                  <a16:creationId xmlns:a16="http://schemas.microsoft.com/office/drawing/2014/main" id="{5CB9A663-7921-4F7A-AFCD-C844C63E34C0}"/>
                 </a:ext>
               </a:extLst>
             </p:cNvPr>
@@ -10579,7 +10581,7 @@
             <p:cNvPr id="28" name="화살표: 오각형 27">
               <a:extLst>
                 <a:ext uri="{FF2B5EF4-FFF2-40B4-BE49-F238E27FC236}">
-                  <a16:creationId xmlns:a16="http://schemas.microsoft.com/office/drawing/2014/main" xmlns="" id="{0C584EFA-D7C2-4983-8C9D-07FC168F6927}"/>
+                  <a16:creationId xmlns:a16="http://schemas.microsoft.com/office/drawing/2014/main" id="{0C584EFA-D7C2-4983-8C9D-07FC168F6927}"/>
                 </a:ext>
               </a:extLst>
             </p:cNvPr>
@@ -10631,7 +10633,7 @@
             <p:cNvPr id="10" name="TextBox 9">
               <a:extLst>
                 <a:ext uri="{FF2B5EF4-FFF2-40B4-BE49-F238E27FC236}">
-                  <a16:creationId xmlns:a16="http://schemas.microsoft.com/office/drawing/2014/main" xmlns="" id="{1217EC73-B895-48FA-ADFF-B204EB3FF1A6}"/>
+                  <a16:creationId xmlns:a16="http://schemas.microsoft.com/office/drawing/2014/main" id="{1217EC73-B895-48FA-ADFF-B204EB3FF1A6}"/>
                 </a:ext>
               </a:extLst>
             </p:cNvPr>
@@ -10785,7 +10787,7 @@
             <p:cNvPr id="9" name="화살표: 오각형 8">
               <a:extLst>
                 <a:ext uri="{FF2B5EF4-FFF2-40B4-BE49-F238E27FC236}">
-                  <a16:creationId xmlns:a16="http://schemas.microsoft.com/office/drawing/2014/main" xmlns="" id="{834B81CB-2BB9-4EAB-8CDE-8B17241BECBE}"/>
+                  <a16:creationId xmlns:a16="http://schemas.microsoft.com/office/drawing/2014/main" id="{834B81CB-2BB9-4EAB-8CDE-8B17241BECBE}"/>
                 </a:ext>
               </a:extLst>
             </p:cNvPr>
@@ -10837,7 +10839,7 @@
             <p:cNvPr id="2" name="TextBox 1">
               <a:extLst>
                 <a:ext uri="{FF2B5EF4-FFF2-40B4-BE49-F238E27FC236}">
-                  <a16:creationId xmlns:a16="http://schemas.microsoft.com/office/drawing/2014/main" xmlns="" id="{F5D93AD1-8F47-47C9-B4AA-54318BAE7350}"/>
+                  <a16:creationId xmlns:a16="http://schemas.microsoft.com/office/drawing/2014/main" id="{F5D93AD1-8F47-47C9-B4AA-54318BAE7350}"/>
                 </a:ext>
               </a:extLst>
             </p:cNvPr>
@@ -10876,7 +10878,7 @@
             <p:cNvPr id="24" name="화살표: 오각형 23">
               <a:extLst>
                 <a:ext uri="{FF2B5EF4-FFF2-40B4-BE49-F238E27FC236}">
-                  <a16:creationId xmlns:a16="http://schemas.microsoft.com/office/drawing/2014/main" xmlns="" id="{78BE4FB6-08BD-44CB-A44D-015777FA2368}"/>
+                  <a16:creationId xmlns:a16="http://schemas.microsoft.com/office/drawing/2014/main" id="{78BE4FB6-08BD-44CB-A44D-015777FA2368}"/>
                 </a:ext>
               </a:extLst>
             </p:cNvPr>
@@ -10928,7 +10930,7 @@
             <p:cNvPr id="3" name="TextBox 2">
               <a:extLst>
                 <a:ext uri="{FF2B5EF4-FFF2-40B4-BE49-F238E27FC236}">
-                  <a16:creationId xmlns:a16="http://schemas.microsoft.com/office/drawing/2014/main" xmlns="" id="{B52EFE78-C9E8-4C2B-BB33-A9C869C5BBFE}"/>
+                  <a16:creationId xmlns:a16="http://schemas.microsoft.com/office/drawing/2014/main" id="{B52EFE78-C9E8-4C2B-BB33-A9C869C5BBFE}"/>
                 </a:ext>
               </a:extLst>
             </p:cNvPr>
@@ -10963,7 +10965,7 @@
             <p:cNvPr id="35" name="TextBox 34">
               <a:extLst>
                 <a:ext uri="{FF2B5EF4-FFF2-40B4-BE49-F238E27FC236}">
-                  <a16:creationId xmlns:a16="http://schemas.microsoft.com/office/drawing/2014/main" xmlns="" id="{BDB6B313-DAB1-4059-B266-F40B2E0EDA0C}"/>
+                  <a16:creationId xmlns:a16="http://schemas.microsoft.com/office/drawing/2014/main" id="{BDB6B313-DAB1-4059-B266-F40B2E0EDA0C}"/>
                 </a:ext>
               </a:extLst>
             </p:cNvPr>
@@ -11011,7 +11013,7 @@
             <p:cNvPr id="41" name="TextBox 40">
               <a:extLst>
                 <a:ext uri="{FF2B5EF4-FFF2-40B4-BE49-F238E27FC236}">
-                  <a16:creationId xmlns:a16="http://schemas.microsoft.com/office/drawing/2014/main" xmlns="" id="{56A8343E-2379-4031-96CC-D40BF1E58F03}"/>
+                  <a16:creationId xmlns:a16="http://schemas.microsoft.com/office/drawing/2014/main" id="{56A8343E-2379-4031-96CC-D40BF1E58F03}"/>
                 </a:ext>
               </a:extLst>
             </p:cNvPr>
@@ -11046,7 +11048,7 @@
             <p:cNvPr id="42" name="TextBox 41">
               <a:extLst>
                 <a:ext uri="{FF2B5EF4-FFF2-40B4-BE49-F238E27FC236}">
-                  <a16:creationId xmlns:a16="http://schemas.microsoft.com/office/drawing/2014/main" xmlns="" id="{59468F7A-E004-4552-BBA0-EFB992E4816C}"/>
+                  <a16:creationId xmlns:a16="http://schemas.microsoft.com/office/drawing/2014/main" id="{59468F7A-E004-4552-BBA0-EFB992E4816C}"/>
                 </a:ext>
               </a:extLst>
             </p:cNvPr>
@@ -11105,7 +11107,7 @@
             <p:cNvPr id="44" name="TextBox 43">
               <a:extLst>
                 <a:ext uri="{FF2B5EF4-FFF2-40B4-BE49-F238E27FC236}">
-                  <a16:creationId xmlns:a16="http://schemas.microsoft.com/office/drawing/2014/main" xmlns="" id="{EFB973DE-7706-4D39-B599-4C8E47EE6412}"/>
+                  <a16:creationId xmlns:a16="http://schemas.microsoft.com/office/drawing/2014/main" id="{EFB973DE-7706-4D39-B599-4C8E47EE6412}"/>
                 </a:ext>
               </a:extLst>
             </p:cNvPr>
@@ -11150,7 +11152,7 @@
           <p:cNvPr id="6" name="TextBox 5">
             <a:extLst>
               <a:ext uri="{FF2B5EF4-FFF2-40B4-BE49-F238E27FC236}">
-                <a16:creationId xmlns:a16="http://schemas.microsoft.com/office/drawing/2014/main" xmlns="" id="{6B0133B4-2460-49A2-A3F9-EA17408098A0}"/>
+                <a16:creationId xmlns:a16="http://schemas.microsoft.com/office/drawing/2014/main" id="{6B0133B4-2460-49A2-A3F9-EA17408098A0}"/>
               </a:ext>
             </a:extLst>
           </p:cNvPr>
@@ -11193,7 +11195,7 @@
     </p:spTree>
     <p:extLst>
       <p:ext uri="{BB962C8B-B14F-4D97-AF65-F5344CB8AC3E}">
-        <p14:creationId xmlns:p14="http://schemas.microsoft.com/office/powerpoint/2010/main" xmlns="" val="2791384885"/>
+        <p14:creationId xmlns:p14="http://schemas.microsoft.com/office/powerpoint/2010/main" val="2791384885"/>
       </p:ext>
     </p:extLst>
   </p:cSld>
@@ -11225,7 +11227,7 @@
           <p:cNvPr id="4" name="직사각형 3">
             <a:extLst>
               <a:ext uri="{FF2B5EF4-FFF2-40B4-BE49-F238E27FC236}">
-                <a16:creationId xmlns:a16="http://schemas.microsoft.com/office/drawing/2014/main" xmlns="" id="{FE483315-6421-4AF3-B26D-D5BA89E6CA0C}"/>
+                <a16:creationId xmlns:a16="http://schemas.microsoft.com/office/drawing/2014/main" id="{FE483315-6421-4AF3-B26D-D5BA89E6CA0C}"/>
               </a:ext>
             </a:extLst>
           </p:cNvPr>
@@ -11277,7 +11279,7 @@
           <p:cNvPr id="9" name="TextBox 8">
             <a:extLst>
               <a:ext uri="{FF2B5EF4-FFF2-40B4-BE49-F238E27FC236}">
-                <a16:creationId xmlns:a16="http://schemas.microsoft.com/office/drawing/2014/main" xmlns="" id="{CED07928-F43B-41D3-91E2-9FA98C5E1688}"/>
+                <a16:creationId xmlns:a16="http://schemas.microsoft.com/office/drawing/2014/main" id="{CED07928-F43B-41D3-91E2-9FA98C5E1688}"/>
               </a:ext>
             </a:extLst>
           </p:cNvPr>
@@ -11357,7 +11359,7 @@
           <p:cNvPr id="10" name="TextBox 9">
             <a:extLst>
               <a:ext uri="{FF2B5EF4-FFF2-40B4-BE49-F238E27FC236}">
-                <a16:creationId xmlns:a16="http://schemas.microsoft.com/office/drawing/2014/main" xmlns="" id="{48698CC2-BC68-4E65-9095-9B971AE42A7B}"/>
+                <a16:creationId xmlns:a16="http://schemas.microsoft.com/office/drawing/2014/main" id="{48698CC2-BC68-4E65-9095-9B971AE42A7B}"/>
               </a:ext>
             </a:extLst>
           </p:cNvPr>
@@ -11400,7 +11402,7 @@
           <p:cNvPr id="7" name="TextBox 6">
             <a:extLst>
               <a:ext uri="{FF2B5EF4-FFF2-40B4-BE49-F238E27FC236}">
-                <a16:creationId xmlns:a16="http://schemas.microsoft.com/office/drawing/2014/main" xmlns="" id="{A5F46E98-F701-49B9-93CD-BA7A25B54242}"/>
+                <a16:creationId xmlns:a16="http://schemas.microsoft.com/office/drawing/2014/main" id="{A5F46E98-F701-49B9-93CD-BA7A25B54242}"/>
               </a:ext>
             </a:extLst>
           </p:cNvPr>
@@ -11530,10 +11532,10 @@
       </p:sp>
       <p:pic>
         <p:nvPicPr>
-          <p:cNvPr id="5" name="그림 4">
-            <a:extLst>
-              <a:ext uri="{FF2B5EF4-FFF2-40B4-BE49-F238E27FC236}">
-                <a16:creationId xmlns:a16="http://schemas.microsoft.com/office/drawing/2014/main" xmlns="" id="{8C956A63-0986-4184-A0E3-7F86E6BA8EA6}"/>
+          <p:cNvPr id="3" name="그림 2" descr="스크린샷이(가) 표시된 사진&#10;&#10;자동 생성된 설명">
+            <a:extLst>
+              <a:ext uri="{FF2B5EF4-FFF2-40B4-BE49-F238E27FC236}">
+                <a16:creationId xmlns:a16="http://schemas.microsoft.com/office/drawing/2014/main" id="{B36A0873-882F-46AF-965A-4648343909D8}"/>
               </a:ext>
             </a:extLst>
           </p:cNvPr>
@@ -11543,10 +11545,10 @@
           <p:nvPr/>
         </p:nvPicPr>
         <p:blipFill>
-          <a:blip r:embed="rId2" cstate="print">
+          <a:blip r:embed="rId2">
             <a:extLst>
               <a:ext uri="{28A0092B-C50C-407E-A947-70E740481C1C}">
-                <a14:useLocalDpi xmlns:a14="http://schemas.microsoft.com/office/drawing/2010/main" xmlns="" val="0"/>
+                <a14:useLocalDpi xmlns:a14="http://schemas.microsoft.com/office/drawing/2010/main" val="0"/>
               </a:ext>
             </a:extLst>
           </a:blip>
@@ -11556,8 +11558,8 @@
         </p:blipFill>
         <p:spPr>
           <a:xfrm>
-            <a:off x="0" y="1888308"/>
-            <a:ext cx="12192000" cy="4875288"/>
+            <a:off x="0" y="2107884"/>
+            <a:ext cx="12192000" cy="4084169"/>
           </a:xfrm>
           <a:prstGeom prst="rect">
             <a:avLst/>
@@ -11567,7 +11569,7 @@
     </p:spTree>
     <p:extLst>
       <p:ext uri="{BB962C8B-B14F-4D97-AF65-F5344CB8AC3E}">
-        <p14:creationId xmlns:p14="http://schemas.microsoft.com/office/powerpoint/2010/main" xmlns="" val="3755570588"/>
+        <p14:creationId xmlns:p14="http://schemas.microsoft.com/office/powerpoint/2010/main" val="3755570588"/>
       </p:ext>
     </p:extLst>
   </p:cSld>
@@ -11599,7 +11601,7 @@
           <p:cNvPr id="4" name="직사각형 3">
             <a:extLst>
               <a:ext uri="{FF2B5EF4-FFF2-40B4-BE49-F238E27FC236}">
-                <a16:creationId xmlns:a16="http://schemas.microsoft.com/office/drawing/2014/main" xmlns="" id="{FE483315-6421-4AF3-B26D-D5BA89E6CA0C}"/>
+                <a16:creationId xmlns:a16="http://schemas.microsoft.com/office/drawing/2014/main" id="{FE483315-6421-4AF3-B26D-D5BA89E6CA0C}"/>
               </a:ext>
             </a:extLst>
           </p:cNvPr>
@@ -11651,7 +11653,7 @@
           <p:cNvPr id="9" name="TextBox 8">
             <a:extLst>
               <a:ext uri="{FF2B5EF4-FFF2-40B4-BE49-F238E27FC236}">
-                <a16:creationId xmlns:a16="http://schemas.microsoft.com/office/drawing/2014/main" xmlns="" id="{CED07928-F43B-41D3-91E2-9FA98C5E1688}"/>
+                <a16:creationId xmlns:a16="http://schemas.microsoft.com/office/drawing/2014/main" id="{CED07928-F43B-41D3-91E2-9FA98C5E1688}"/>
               </a:ext>
             </a:extLst>
           </p:cNvPr>
@@ -11731,7 +11733,7 @@
           <p:cNvPr id="10" name="TextBox 9">
             <a:extLst>
               <a:ext uri="{FF2B5EF4-FFF2-40B4-BE49-F238E27FC236}">
-                <a16:creationId xmlns:a16="http://schemas.microsoft.com/office/drawing/2014/main" xmlns="" id="{48698CC2-BC68-4E65-9095-9B971AE42A7B}"/>
+                <a16:creationId xmlns:a16="http://schemas.microsoft.com/office/drawing/2014/main" id="{48698CC2-BC68-4E65-9095-9B971AE42A7B}"/>
               </a:ext>
             </a:extLst>
           </p:cNvPr>
@@ -11783,7 +11785,7 @@
           <p:cNvPr id="7" name="TextBox 6">
             <a:extLst>
               <a:ext uri="{FF2B5EF4-FFF2-40B4-BE49-F238E27FC236}">
-                <a16:creationId xmlns:a16="http://schemas.microsoft.com/office/drawing/2014/main" xmlns="" id="{A5F46E98-F701-49B9-93CD-BA7A25B54242}"/>
+                <a16:creationId xmlns:a16="http://schemas.microsoft.com/office/drawing/2014/main" id="{A5F46E98-F701-49B9-93CD-BA7A25B54242}"/>
               </a:ext>
             </a:extLst>
           </p:cNvPr>
@@ -11916,7 +11918,7 @@
           <p:cNvPr id="3" name="그림 2" descr="스크린샷이(가) 표시된 사진&#10;&#10;자동 생성된 설명">
             <a:extLst>
               <a:ext uri="{FF2B5EF4-FFF2-40B4-BE49-F238E27FC236}">
-                <a16:creationId xmlns:a16="http://schemas.microsoft.com/office/drawing/2014/main" xmlns="" id="{1686E4DD-47D6-4E33-9809-9ED4A44FBE17}"/>
+                <a16:creationId xmlns:a16="http://schemas.microsoft.com/office/drawing/2014/main" id="{1686E4DD-47D6-4E33-9809-9ED4A44FBE17}"/>
               </a:ext>
             </a:extLst>
           </p:cNvPr>
@@ -11929,7 +11931,7 @@
           <a:blip r:embed="rId2" cstate="print">
             <a:extLst>
               <a:ext uri="{28A0092B-C50C-407E-A947-70E740481C1C}">
-                <a14:useLocalDpi xmlns:a14="http://schemas.microsoft.com/office/drawing/2010/main" xmlns="" val="0"/>
+                <a14:useLocalDpi xmlns:a14="http://schemas.microsoft.com/office/drawing/2010/main" val="0"/>
               </a:ext>
             </a:extLst>
           </a:blip>
@@ -11952,7 +11954,7 @@
           <p:cNvPr id="5" name="TextBox 4">
             <a:extLst>
               <a:ext uri="{FF2B5EF4-FFF2-40B4-BE49-F238E27FC236}">
-                <a16:creationId xmlns:a16="http://schemas.microsoft.com/office/drawing/2014/main" xmlns="" id="{9C1F2AC1-0CEF-49E1-84FA-8C47A46E3A21}"/>
+                <a16:creationId xmlns:a16="http://schemas.microsoft.com/office/drawing/2014/main" id="{9C1F2AC1-0CEF-49E1-84FA-8C47A46E3A21}"/>
               </a:ext>
             </a:extLst>
           </p:cNvPr>
@@ -12089,7 +12091,7 @@
     </p:spTree>
     <p:extLst>
       <p:ext uri="{BB962C8B-B14F-4D97-AF65-F5344CB8AC3E}">
-        <p14:creationId xmlns:p14="http://schemas.microsoft.com/office/powerpoint/2010/main" xmlns="" val="2880335481"/>
+        <p14:creationId xmlns:p14="http://schemas.microsoft.com/office/powerpoint/2010/main" val="2880335481"/>
       </p:ext>
     </p:extLst>
   </p:cSld>
@@ -12121,7 +12123,7 @@
           <p:cNvPr id="4" name="직사각형 3">
             <a:extLst>
               <a:ext uri="{FF2B5EF4-FFF2-40B4-BE49-F238E27FC236}">
-                <a16:creationId xmlns:a16="http://schemas.microsoft.com/office/drawing/2014/main" xmlns="" id="{FE483315-6421-4AF3-B26D-D5BA89E6CA0C}"/>
+                <a16:creationId xmlns:a16="http://schemas.microsoft.com/office/drawing/2014/main" id="{FE483315-6421-4AF3-B26D-D5BA89E6CA0C}"/>
               </a:ext>
             </a:extLst>
           </p:cNvPr>
@@ -12173,7 +12175,7 @@
           <p:cNvPr id="9" name="TextBox 8">
             <a:extLst>
               <a:ext uri="{FF2B5EF4-FFF2-40B4-BE49-F238E27FC236}">
-                <a16:creationId xmlns:a16="http://schemas.microsoft.com/office/drawing/2014/main" xmlns="" id="{CED07928-F43B-41D3-91E2-9FA98C5E1688}"/>
+                <a16:creationId xmlns:a16="http://schemas.microsoft.com/office/drawing/2014/main" id="{CED07928-F43B-41D3-91E2-9FA98C5E1688}"/>
               </a:ext>
             </a:extLst>
           </p:cNvPr>
@@ -12253,7 +12255,7 @@
           <p:cNvPr id="10" name="TextBox 9">
             <a:extLst>
               <a:ext uri="{FF2B5EF4-FFF2-40B4-BE49-F238E27FC236}">
-                <a16:creationId xmlns:a16="http://schemas.microsoft.com/office/drawing/2014/main" xmlns="" id="{48698CC2-BC68-4E65-9095-9B971AE42A7B}"/>
+                <a16:creationId xmlns:a16="http://schemas.microsoft.com/office/drawing/2014/main" id="{48698CC2-BC68-4E65-9095-9B971AE42A7B}"/>
               </a:ext>
             </a:extLst>
           </p:cNvPr>
@@ -12305,7 +12307,7 @@
           <p:cNvPr id="7" name="TextBox 6">
             <a:extLst>
               <a:ext uri="{FF2B5EF4-FFF2-40B4-BE49-F238E27FC236}">
-                <a16:creationId xmlns:a16="http://schemas.microsoft.com/office/drawing/2014/main" xmlns="" id="{A5F46E98-F701-49B9-93CD-BA7A25B54242}"/>
+                <a16:creationId xmlns:a16="http://schemas.microsoft.com/office/drawing/2014/main" id="{A5F46E98-F701-49B9-93CD-BA7A25B54242}"/>
               </a:ext>
             </a:extLst>
           </p:cNvPr>
@@ -12438,7 +12440,7 @@
           <p:cNvPr id="5" name="그림 4">
             <a:extLst>
               <a:ext uri="{FF2B5EF4-FFF2-40B4-BE49-F238E27FC236}">
-                <a16:creationId xmlns:a16="http://schemas.microsoft.com/office/drawing/2014/main" xmlns="" id="{4565DB2B-8A6A-4310-9458-4866477AA340}"/>
+                <a16:creationId xmlns:a16="http://schemas.microsoft.com/office/drawing/2014/main" id="{4565DB2B-8A6A-4310-9458-4866477AA340}"/>
               </a:ext>
             </a:extLst>
           </p:cNvPr>
@@ -12451,7 +12453,7 @@
           <a:blip r:embed="rId2" cstate="print">
             <a:extLst>
               <a:ext uri="{28A0092B-C50C-407E-A947-70E740481C1C}">
-                <a14:useLocalDpi xmlns:a14="http://schemas.microsoft.com/office/drawing/2010/main" xmlns="" val="0"/>
+                <a14:useLocalDpi xmlns:a14="http://schemas.microsoft.com/office/drawing/2010/main" val="0"/>
               </a:ext>
             </a:extLst>
           </a:blip>
@@ -12474,7 +12476,7 @@
           <p:cNvPr id="8" name="그림 7" descr="스크린샷이(가) 표시된 사진&#10;&#10;자동 생성된 설명">
             <a:extLst>
               <a:ext uri="{FF2B5EF4-FFF2-40B4-BE49-F238E27FC236}">
-                <a16:creationId xmlns:a16="http://schemas.microsoft.com/office/drawing/2014/main" xmlns="" id="{D5217DB6-1496-4C39-B268-FDC00B85E89F}"/>
+                <a16:creationId xmlns:a16="http://schemas.microsoft.com/office/drawing/2014/main" id="{D5217DB6-1496-4C39-B268-FDC00B85E89F}"/>
               </a:ext>
             </a:extLst>
           </p:cNvPr>
@@ -12487,7 +12489,7 @@
           <a:blip r:embed="rId3" cstate="print">
             <a:extLst>
               <a:ext uri="{28A0092B-C50C-407E-A947-70E740481C1C}">
-                <a14:useLocalDpi xmlns:a14="http://schemas.microsoft.com/office/drawing/2010/main" xmlns="" val="0"/>
+                <a14:useLocalDpi xmlns:a14="http://schemas.microsoft.com/office/drawing/2010/main" val="0"/>
               </a:ext>
             </a:extLst>
           </a:blip>
@@ -12510,7 +12512,7 @@
           <p:cNvPr id="11" name="직선 연결선 10">
             <a:extLst>
               <a:ext uri="{FF2B5EF4-FFF2-40B4-BE49-F238E27FC236}">
-                <a16:creationId xmlns:a16="http://schemas.microsoft.com/office/drawing/2014/main" xmlns="" id="{7CA066E6-8903-4E36-B939-999C799791B2}"/>
+                <a16:creationId xmlns:a16="http://schemas.microsoft.com/office/drawing/2014/main" id="{7CA066E6-8903-4E36-B939-999C799791B2}"/>
               </a:ext>
             </a:extLst>
           </p:cNvPr>
@@ -12554,7 +12556,7 @@
           <p:cNvPr id="13" name="직선 연결선 12">
             <a:extLst>
               <a:ext uri="{FF2B5EF4-FFF2-40B4-BE49-F238E27FC236}">
-                <a16:creationId xmlns:a16="http://schemas.microsoft.com/office/drawing/2014/main" xmlns="" id="{FAC1C5DB-DD4F-47A9-B2EC-2F9CC6D42161}"/>
+                <a16:creationId xmlns:a16="http://schemas.microsoft.com/office/drawing/2014/main" id="{FAC1C5DB-DD4F-47A9-B2EC-2F9CC6D42161}"/>
               </a:ext>
             </a:extLst>
           </p:cNvPr>
@@ -12596,7 +12598,7 @@
     </p:spTree>
     <p:extLst>
       <p:ext uri="{BB962C8B-B14F-4D97-AF65-F5344CB8AC3E}">
-        <p14:creationId xmlns:p14="http://schemas.microsoft.com/office/powerpoint/2010/main" xmlns="" val="1099539314"/>
+        <p14:creationId xmlns:p14="http://schemas.microsoft.com/office/powerpoint/2010/main" val="1099539314"/>
       </p:ext>
     </p:extLst>
   </p:cSld>
@@ -12628,7 +12630,7 @@
           <p:cNvPr id="4" name="직사각형 3">
             <a:extLst>
               <a:ext uri="{FF2B5EF4-FFF2-40B4-BE49-F238E27FC236}">
-                <a16:creationId xmlns:a16="http://schemas.microsoft.com/office/drawing/2014/main" xmlns="" id="{FE483315-6421-4AF3-B26D-D5BA89E6CA0C}"/>
+                <a16:creationId xmlns:a16="http://schemas.microsoft.com/office/drawing/2014/main" id="{FE483315-6421-4AF3-B26D-D5BA89E6CA0C}"/>
               </a:ext>
             </a:extLst>
           </p:cNvPr>
@@ -12680,7 +12682,7 @@
           <p:cNvPr id="9" name="TextBox 8">
             <a:extLst>
               <a:ext uri="{FF2B5EF4-FFF2-40B4-BE49-F238E27FC236}">
-                <a16:creationId xmlns:a16="http://schemas.microsoft.com/office/drawing/2014/main" xmlns="" id="{CED07928-F43B-41D3-91E2-9FA98C5E1688}"/>
+                <a16:creationId xmlns:a16="http://schemas.microsoft.com/office/drawing/2014/main" id="{CED07928-F43B-41D3-91E2-9FA98C5E1688}"/>
               </a:ext>
             </a:extLst>
           </p:cNvPr>
@@ -12760,7 +12762,7 @@
           <p:cNvPr id="10" name="TextBox 9">
             <a:extLst>
               <a:ext uri="{FF2B5EF4-FFF2-40B4-BE49-F238E27FC236}">
-                <a16:creationId xmlns:a16="http://schemas.microsoft.com/office/drawing/2014/main" xmlns="" id="{48698CC2-BC68-4E65-9095-9B971AE42A7B}"/>
+                <a16:creationId xmlns:a16="http://schemas.microsoft.com/office/drawing/2014/main" id="{48698CC2-BC68-4E65-9095-9B971AE42A7B}"/>
               </a:ext>
             </a:extLst>
           </p:cNvPr>
@@ -12812,7 +12814,7 @@
           <p:cNvPr id="7" name="TextBox 6">
             <a:extLst>
               <a:ext uri="{FF2B5EF4-FFF2-40B4-BE49-F238E27FC236}">
-                <a16:creationId xmlns:a16="http://schemas.microsoft.com/office/drawing/2014/main" xmlns="" id="{A5F46E98-F701-49B9-93CD-BA7A25B54242}"/>
+                <a16:creationId xmlns:a16="http://schemas.microsoft.com/office/drawing/2014/main" id="{A5F46E98-F701-49B9-93CD-BA7A25B54242}"/>
               </a:ext>
             </a:extLst>
           </p:cNvPr>
@@ -12945,7 +12947,7 @@
           <p:cNvPr id="3" name="그림 2" descr="텍스트이(가) 표시된 사진&#10;&#10;자동 생성된 설명">
             <a:extLst>
               <a:ext uri="{FF2B5EF4-FFF2-40B4-BE49-F238E27FC236}">
-                <a16:creationId xmlns:a16="http://schemas.microsoft.com/office/drawing/2014/main" xmlns="" id="{4E5D598D-1331-4BC9-B052-463B6F091C75}"/>
+                <a16:creationId xmlns:a16="http://schemas.microsoft.com/office/drawing/2014/main" id="{4E5D598D-1331-4BC9-B052-463B6F091C75}"/>
               </a:ext>
             </a:extLst>
           </p:cNvPr>
@@ -12958,7 +12960,7 @@
           <a:blip r:embed="rId2" cstate="print">
             <a:extLst>
               <a:ext uri="{28A0092B-C50C-407E-A947-70E740481C1C}">
-                <a14:useLocalDpi xmlns:a14="http://schemas.microsoft.com/office/drawing/2010/main" xmlns="" val="0"/>
+                <a14:useLocalDpi xmlns:a14="http://schemas.microsoft.com/office/drawing/2010/main" val="0"/>
               </a:ext>
             </a:extLst>
           </a:blip>
@@ -12981,7 +12983,7 @@
           <p:cNvPr id="8" name="그림 7">
             <a:extLst>
               <a:ext uri="{FF2B5EF4-FFF2-40B4-BE49-F238E27FC236}">
-                <a16:creationId xmlns:a16="http://schemas.microsoft.com/office/drawing/2014/main" xmlns="" id="{59C113E6-CEBB-4696-80A2-BDACADA884AE}"/>
+                <a16:creationId xmlns:a16="http://schemas.microsoft.com/office/drawing/2014/main" id="{59C113E6-CEBB-4696-80A2-BDACADA884AE}"/>
               </a:ext>
             </a:extLst>
           </p:cNvPr>
@@ -12994,7 +12996,7 @@
           <a:blip r:embed="rId3" cstate="print">
             <a:extLst>
               <a:ext uri="{28A0092B-C50C-407E-A947-70E740481C1C}">
-                <a14:useLocalDpi xmlns:a14="http://schemas.microsoft.com/office/drawing/2010/main" xmlns="" val="0"/>
+                <a14:useLocalDpi xmlns:a14="http://schemas.microsoft.com/office/drawing/2010/main" val="0"/>
               </a:ext>
             </a:extLst>
           </a:blip>
@@ -13017,7 +13019,7 @@
           <p:cNvPr id="11" name="TextBox 10">
             <a:extLst>
               <a:ext uri="{FF2B5EF4-FFF2-40B4-BE49-F238E27FC236}">
-                <a16:creationId xmlns:a16="http://schemas.microsoft.com/office/drawing/2014/main" xmlns="" id="{9F822B7F-7FEC-4EB7-9F47-FE5AFE2A1E2C}"/>
+                <a16:creationId xmlns:a16="http://schemas.microsoft.com/office/drawing/2014/main" id="{9F822B7F-7FEC-4EB7-9F47-FE5AFE2A1E2C}"/>
               </a:ext>
             </a:extLst>
           </p:cNvPr>
@@ -13056,7 +13058,7 @@
           <p:cNvPr id="27" name="그룹 26">
             <a:extLst>
               <a:ext uri="{FF2B5EF4-FFF2-40B4-BE49-F238E27FC236}">
-                <a16:creationId xmlns:a16="http://schemas.microsoft.com/office/drawing/2014/main" xmlns="" id="{2D7C50C8-8DC0-4ED8-8EFF-2F3BB1A344F4}"/>
+                <a16:creationId xmlns:a16="http://schemas.microsoft.com/office/drawing/2014/main" id="{2D7C50C8-8DC0-4ED8-8EFF-2F3BB1A344F4}"/>
               </a:ext>
             </a:extLst>
           </p:cNvPr>
@@ -13076,7 +13078,7 @@
             <p:cNvPr id="12" name="사각형: 둥근 모서리 11">
               <a:extLst>
                 <a:ext uri="{FF2B5EF4-FFF2-40B4-BE49-F238E27FC236}">
-                  <a16:creationId xmlns:a16="http://schemas.microsoft.com/office/drawing/2014/main" xmlns="" id="{5AFB1B7E-7436-4445-AB65-1CFA41A113C5}"/>
+                  <a16:creationId xmlns:a16="http://schemas.microsoft.com/office/drawing/2014/main" id="{5AFB1B7E-7436-4445-AB65-1CFA41A113C5}"/>
                 </a:ext>
               </a:extLst>
             </p:cNvPr>
@@ -13130,7 +13132,7 @@
             <p:cNvPr id="13" name="사각형: 둥근 모서리 12">
               <a:extLst>
                 <a:ext uri="{FF2B5EF4-FFF2-40B4-BE49-F238E27FC236}">
-                  <a16:creationId xmlns:a16="http://schemas.microsoft.com/office/drawing/2014/main" xmlns="" id="{879A6B27-3C80-401C-BD39-051974061992}"/>
+                  <a16:creationId xmlns:a16="http://schemas.microsoft.com/office/drawing/2014/main" id="{879A6B27-3C80-401C-BD39-051974061992}"/>
                 </a:ext>
               </a:extLst>
             </p:cNvPr>
@@ -13184,7 +13186,7 @@
             <p:cNvPr id="15" name="사각형: 둥근 모서리 14">
               <a:extLst>
                 <a:ext uri="{FF2B5EF4-FFF2-40B4-BE49-F238E27FC236}">
-                  <a16:creationId xmlns:a16="http://schemas.microsoft.com/office/drawing/2014/main" xmlns="" id="{2616AF2F-E761-4B92-A963-623D8F7067C0}"/>
+                  <a16:creationId xmlns:a16="http://schemas.microsoft.com/office/drawing/2014/main" id="{2616AF2F-E761-4B92-A963-623D8F7067C0}"/>
                 </a:ext>
               </a:extLst>
             </p:cNvPr>
@@ -13238,7 +13240,7 @@
             <p:cNvPr id="17" name="사각형: 둥근 모서리 16">
               <a:extLst>
                 <a:ext uri="{FF2B5EF4-FFF2-40B4-BE49-F238E27FC236}">
-                  <a16:creationId xmlns:a16="http://schemas.microsoft.com/office/drawing/2014/main" xmlns="" id="{1162283C-308C-4871-BFA7-0EABA6F1DAB9}"/>
+                  <a16:creationId xmlns:a16="http://schemas.microsoft.com/office/drawing/2014/main" id="{1162283C-308C-4871-BFA7-0EABA6F1DAB9}"/>
                 </a:ext>
               </a:extLst>
             </p:cNvPr>
@@ -13292,7 +13294,7 @@
             <p:cNvPr id="18" name="사각형: 둥근 모서리 17">
               <a:extLst>
                 <a:ext uri="{FF2B5EF4-FFF2-40B4-BE49-F238E27FC236}">
-                  <a16:creationId xmlns:a16="http://schemas.microsoft.com/office/drawing/2014/main" xmlns="" id="{9F326BDB-5D57-44D5-88DE-9E8524070D15}"/>
+                  <a16:creationId xmlns:a16="http://schemas.microsoft.com/office/drawing/2014/main" id="{9F326BDB-5D57-44D5-88DE-9E8524070D15}"/>
                 </a:ext>
               </a:extLst>
             </p:cNvPr>
@@ -13347,7 +13349,7 @@
           <p:cNvPr id="19" name="사각형: 둥근 모서리 18">
             <a:extLst>
               <a:ext uri="{FF2B5EF4-FFF2-40B4-BE49-F238E27FC236}">
-                <a16:creationId xmlns:a16="http://schemas.microsoft.com/office/drawing/2014/main" xmlns="" id="{457BE2C7-2AAF-40D7-BFFE-D2821EA7F92D}"/>
+                <a16:creationId xmlns:a16="http://schemas.microsoft.com/office/drawing/2014/main" id="{457BE2C7-2AAF-40D7-BFFE-D2821EA7F92D}"/>
               </a:ext>
             </a:extLst>
           </p:cNvPr>
@@ -13401,7 +13403,7 @@
           <p:cNvPr id="47" name="그룹 46">
             <a:extLst>
               <a:ext uri="{FF2B5EF4-FFF2-40B4-BE49-F238E27FC236}">
-                <a16:creationId xmlns:a16="http://schemas.microsoft.com/office/drawing/2014/main" xmlns="" id="{88CCA945-E54D-4961-A87B-BFB0B70A1BA5}"/>
+                <a16:creationId xmlns:a16="http://schemas.microsoft.com/office/drawing/2014/main" id="{88CCA945-E54D-4961-A87B-BFB0B70A1BA5}"/>
               </a:ext>
             </a:extLst>
           </p:cNvPr>
@@ -13421,7 +13423,7 @@
             <p:cNvPr id="35" name="그룹 34">
               <a:extLst>
                 <a:ext uri="{FF2B5EF4-FFF2-40B4-BE49-F238E27FC236}">
-                  <a16:creationId xmlns:a16="http://schemas.microsoft.com/office/drawing/2014/main" xmlns="" id="{CF1857E5-41D7-4FF9-927A-4A7C3AA22E81}"/>
+                  <a16:creationId xmlns:a16="http://schemas.microsoft.com/office/drawing/2014/main" id="{CF1857E5-41D7-4FF9-927A-4A7C3AA22E81}"/>
                 </a:ext>
               </a:extLst>
             </p:cNvPr>
@@ -13441,7 +13443,7 @@
               <p:cNvPr id="36" name="사각형: 둥근 모서리 35">
                 <a:extLst>
                   <a:ext uri="{FF2B5EF4-FFF2-40B4-BE49-F238E27FC236}">
-                    <a16:creationId xmlns:a16="http://schemas.microsoft.com/office/drawing/2014/main" xmlns="" id="{BE9DE140-6746-455D-A177-B30ACB277348}"/>
+                    <a16:creationId xmlns:a16="http://schemas.microsoft.com/office/drawing/2014/main" id="{BE9DE140-6746-455D-A177-B30ACB277348}"/>
                   </a:ext>
                 </a:extLst>
               </p:cNvPr>
@@ -13495,7 +13497,7 @@
               <p:cNvPr id="37" name="사각형: 둥근 모서리 36">
                 <a:extLst>
                   <a:ext uri="{FF2B5EF4-FFF2-40B4-BE49-F238E27FC236}">
-                    <a16:creationId xmlns:a16="http://schemas.microsoft.com/office/drawing/2014/main" xmlns="" id="{6647DB9D-1D1A-4AA4-AED5-3636CE8B038C}"/>
+                    <a16:creationId xmlns:a16="http://schemas.microsoft.com/office/drawing/2014/main" id="{6647DB9D-1D1A-4AA4-AED5-3636CE8B038C}"/>
                   </a:ext>
                 </a:extLst>
               </p:cNvPr>
@@ -13549,7 +13551,7 @@
               <p:cNvPr id="38" name="사각형: 둥근 모서리 37">
                 <a:extLst>
                   <a:ext uri="{FF2B5EF4-FFF2-40B4-BE49-F238E27FC236}">
-                    <a16:creationId xmlns:a16="http://schemas.microsoft.com/office/drawing/2014/main" xmlns="" id="{4BCD44AE-F7C6-4A95-86FD-AC011093D0D8}"/>
+                    <a16:creationId xmlns:a16="http://schemas.microsoft.com/office/drawing/2014/main" id="{4BCD44AE-F7C6-4A95-86FD-AC011093D0D8}"/>
                   </a:ext>
                 </a:extLst>
               </p:cNvPr>
@@ -13603,7 +13605,7 @@
               <p:cNvPr id="39" name="사각형: 둥근 모서리 38">
                 <a:extLst>
                   <a:ext uri="{FF2B5EF4-FFF2-40B4-BE49-F238E27FC236}">
-                    <a16:creationId xmlns:a16="http://schemas.microsoft.com/office/drawing/2014/main" xmlns="" id="{E424EB69-7D55-4422-9BF0-ADE82C7E8836}"/>
+                    <a16:creationId xmlns:a16="http://schemas.microsoft.com/office/drawing/2014/main" id="{E424EB69-7D55-4422-9BF0-ADE82C7E8836}"/>
                   </a:ext>
                 </a:extLst>
               </p:cNvPr>
@@ -13657,7 +13659,7 @@
               <p:cNvPr id="40" name="사각형: 둥근 모서리 39">
                 <a:extLst>
                   <a:ext uri="{FF2B5EF4-FFF2-40B4-BE49-F238E27FC236}">
-                    <a16:creationId xmlns:a16="http://schemas.microsoft.com/office/drawing/2014/main" xmlns="" id="{A77ABA65-ADFB-4C7F-91C5-35FFE2C769BB}"/>
+                    <a16:creationId xmlns:a16="http://schemas.microsoft.com/office/drawing/2014/main" id="{A77ABA65-ADFB-4C7F-91C5-35FFE2C769BB}"/>
                   </a:ext>
                 </a:extLst>
               </p:cNvPr>
@@ -13712,7 +13714,7 @@
             <p:cNvPr id="41" name="그룹 40">
               <a:extLst>
                 <a:ext uri="{FF2B5EF4-FFF2-40B4-BE49-F238E27FC236}">
-                  <a16:creationId xmlns:a16="http://schemas.microsoft.com/office/drawing/2014/main" xmlns="" id="{48F96B4F-92D1-4A8C-80BD-1A0BA01EAC3E}"/>
+                  <a16:creationId xmlns:a16="http://schemas.microsoft.com/office/drawing/2014/main" id="{48F96B4F-92D1-4A8C-80BD-1A0BA01EAC3E}"/>
                 </a:ext>
               </a:extLst>
             </p:cNvPr>
@@ -13732,7 +13734,7 @@
               <p:cNvPr id="42" name="사각형: 둥근 모서리 41">
                 <a:extLst>
                   <a:ext uri="{FF2B5EF4-FFF2-40B4-BE49-F238E27FC236}">
-                    <a16:creationId xmlns:a16="http://schemas.microsoft.com/office/drawing/2014/main" xmlns="" id="{20AAC7D3-BEC1-4F0C-B73C-6C5BF13B1909}"/>
+                    <a16:creationId xmlns:a16="http://schemas.microsoft.com/office/drawing/2014/main" id="{20AAC7D3-BEC1-4F0C-B73C-6C5BF13B1909}"/>
                   </a:ext>
                 </a:extLst>
               </p:cNvPr>
@@ -13786,7 +13788,7 @@
               <p:cNvPr id="43" name="사각형: 둥근 모서리 42">
                 <a:extLst>
                   <a:ext uri="{FF2B5EF4-FFF2-40B4-BE49-F238E27FC236}">
-                    <a16:creationId xmlns:a16="http://schemas.microsoft.com/office/drawing/2014/main" xmlns="" id="{556E8F84-92A5-48C8-A1E1-FFC512514ADE}"/>
+                    <a16:creationId xmlns:a16="http://schemas.microsoft.com/office/drawing/2014/main" id="{556E8F84-92A5-48C8-A1E1-FFC512514ADE}"/>
                   </a:ext>
                 </a:extLst>
               </p:cNvPr>
@@ -13840,7 +13842,7 @@
               <p:cNvPr id="44" name="사각형: 둥근 모서리 43">
                 <a:extLst>
                   <a:ext uri="{FF2B5EF4-FFF2-40B4-BE49-F238E27FC236}">
-                    <a16:creationId xmlns:a16="http://schemas.microsoft.com/office/drawing/2014/main" xmlns="" id="{54EA9680-7786-411A-A908-2F873C623865}"/>
+                    <a16:creationId xmlns:a16="http://schemas.microsoft.com/office/drawing/2014/main" id="{54EA9680-7786-411A-A908-2F873C623865}"/>
                   </a:ext>
                 </a:extLst>
               </p:cNvPr>
@@ -13894,7 +13896,7 @@
               <p:cNvPr id="45" name="사각형: 둥근 모서리 44">
                 <a:extLst>
                   <a:ext uri="{FF2B5EF4-FFF2-40B4-BE49-F238E27FC236}">
-                    <a16:creationId xmlns:a16="http://schemas.microsoft.com/office/drawing/2014/main" xmlns="" id="{72E64FD2-B60B-4A74-B005-630547A1971D}"/>
+                    <a16:creationId xmlns:a16="http://schemas.microsoft.com/office/drawing/2014/main" id="{72E64FD2-B60B-4A74-B005-630547A1971D}"/>
                   </a:ext>
                 </a:extLst>
               </p:cNvPr>
@@ -13948,7 +13950,7 @@
               <p:cNvPr id="46" name="사각형: 둥근 모서리 45">
                 <a:extLst>
                   <a:ext uri="{FF2B5EF4-FFF2-40B4-BE49-F238E27FC236}">
-                    <a16:creationId xmlns:a16="http://schemas.microsoft.com/office/drawing/2014/main" xmlns="" id="{B620B8A2-8E23-48A9-86C2-C83F21A4C2E3}"/>
+                    <a16:creationId xmlns:a16="http://schemas.microsoft.com/office/drawing/2014/main" id="{B620B8A2-8E23-48A9-86C2-C83F21A4C2E3}"/>
                   </a:ext>
                 </a:extLst>
               </p:cNvPr>
@@ -14004,7 +14006,7 @@
           <p:cNvPr id="48" name="사각형: 둥근 모서리 47">
             <a:extLst>
               <a:ext uri="{FF2B5EF4-FFF2-40B4-BE49-F238E27FC236}">
-                <a16:creationId xmlns:a16="http://schemas.microsoft.com/office/drawing/2014/main" xmlns="" id="{730C02E4-3781-41BE-A64F-14807529B4C0}"/>
+                <a16:creationId xmlns:a16="http://schemas.microsoft.com/office/drawing/2014/main" id="{730C02E4-3781-41BE-A64F-14807529B4C0}"/>
               </a:ext>
             </a:extLst>
           </p:cNvPr>
@@ -14058,7 +14060,7 @@
           <p:cNvPr id="49" name="사각형: 둥근 모서리 48">
             <a:extLst>
               <a:ext uri="{FF2B5EF4-FFF2-40B4-BE49-F238E27FC236}">
-                <a16:creationId xmlns:a16="http://schemas.microsoft.com/office/drawing/2014/main" xmlns="" id="{29CF4779-F172-4CEB-9A45-F8F237F50894}"/>
+                <a16:creationId xmlns:a16="http://schemas.microsoft.com/office/drawing/2014/main" id="{29CF4779-F172-4CEB-9A45-F8F237F50894}"/>
               </a:ext>
             </a:extLst>
           </p:cNvPr>
@@ -14110,7 +14112,7 @@
     </p:spTree>
     <p:extLst>
       <p:ext uri="{BB962C8B-B14F-4D97-AF65-F5344CB8AC3E}">
-        <p14:creationId xmlns:p14="http://schemas.microsoft.com/office/powerpoint/2010/main" xmlns="" val="2111796480"/>
+        <p14:creationId xmlns:p14="http://schemas.microsoft.com/office/powerpoint/2010/main" val="2111796480"/>
       </p:ext>
     </p:extLst>
   </p:cSld>
@@ -14142,7 +14144,7 @@
           <p:cNvPr id="4" name="직사각형 3">
             <a:extLst>
               <a:ext uri="{FF2B5EF4-FFF2-40B4-BE49-F238E27FC236}">
-                <a16:creationId xmlns:a16="http://schemas.microsoft.com/office/drawing/2014/main" xmlns="" id="{FE483315-6421-4AF3-B26D-D5BA89E6CA0C}"/>
+                <a16:creationId xmlns:a16="http://schemas.microsoft.com/office/drawing/2014/main" id="{FE483315-6421-4AF3-B26D-D5BA89E6CA0C}"/>
               </a:ext>
             </a:extLst>
           </p:cNvPr>
@@ -14194,7 +14196,7 @@
           <p:cNvPr id="9" name="TextBox 8">
             <a:extLst>
               <a:ext uri="{FF2B5EF4-FFF2-40B4-BE49-F238E27FC236}">
-                <a16:creationId xmlns:a16="http://schemas.microsoft.com/office/drawing/2014/main" xmlns="" id="{CED07928-F43B-41D3-91E2-9FA98C5E1688}"/>
+                <a16:creationId xmlns:a16="http://schemas.microsoft.com/office/drawing/2014/main" id="{CED07928-F43B-41D3-91E2-9FA98C5E1688}"/>
               </a:ext>
             </a:extLst>
           </p:cNvPr>
@@ -14274,7 +14276,7 @@
           <p:cNvPr id="10" name="TextBox 9">
             <a:extLst>
               <a:ext uri="{FF2B5EF4-FFF2-40B4-BE49-F238E27FC236}">
-                <a16:creationId xmlns:a16="http://schemas.microsoft.com/office/drawing/2014/main" xmlns="" id="{48698CC2-BC68-4E65-9095-9B971AE42A7B}"/>
+                <a16:creationId xmlns:a16="http://schemas.microsoft.com/office/drawing/2014/main" id="{48698CC2-BC68-4E65-9095-9B971AE42A7B}"/>
               </a:ext>
             </a:extLst>
           </p:cNvPr>
@@ -14326,7 +14328,7 @@
           <p:cNvPr id="7" name="TextBox 6">
             <a:extLst>
               <a:ext uri="{FF2B5EF4-FFF2-40B4-BE49-F238E27FC236}">
-                <a16:creationId xmlns:a16="http://schemas.microsoft.com/office/drawing/2014/main" xmlns="" id="{A5F46E98-F701-49B9-93CD-BA7A25B54242}"/>
+                <a16:creationId xmlns:a16="http://schemas.microsoft.com/office/drawing/2014/main" id="{A5F46E98-F701-49B9-93CD-BA7A25B54242}"/>
               </a:ext>
             </a:extLst>
           </p:cNvPr>
@@ -14459,7 +14461,7 @@
           <p:cNvPr id="3" name="그림 2" descr="텍스트이(가) 표시된 사진&#10;&#10;자동 생성된 설명">
             <a:extLst>
               <a:ext uri="{FF2B5EF4-FFF2-40B4-BE49-F238E27FC236}">
-                <a16:creationId xmlns:a16="http://schemas.microsoft.com/office/drawing/2014/main" xmlns="" id="{A15EC96E-D0C5-4ED8-B60B-7BBAC62CB4B7}"/>
+                <a16:creationId xmlns:a16="http://schemas.microsoft.com/office/drawing/2014/main" id="{A15EC96E-D0C5-4ED8-B60B-7BBAC62CB4B7}"/>
               </a:ext>
             </a:extLst>
           </p:cNvPr>
@@ -14472,7 +14474,7 @@
           <a:blip r:embed="rId2" cstate="print">
             <a:extLst>
               <a:ext uri="{28A0092B-C50C-407E-A947-70E740481C1C}">
-                <a14:useLocalDpi xmlns:a14="http://schemas.microsoft.com/office/drawing/2010/main" xmlns="" val="0"/>
+                <a14:useLocalDpi xmlns:a14="http://schemas.microsoft.com/office/drawing/2010/main" val="0"/>
               </a:ext>
             </a:extLst>
           </a:blip>
@@ -14495,7 +14497,7 @@
           <p:cNvPr id="5" name="TextBox 4">
             <a:extLst>
               <a:ext uri="{FF2B5EF4-FFF2-40B4-BE49-F238E27FC236}">
-                <a16:creationId xmlns:a16="http://schemas.microsoft.com/office/drawing/2014/main" xmlns="" id="{010DF240-920B-4843-8EE1-B4D1A8CFD219}"/>
+                <a16:creationId xmlns:a16="http://schemas.microsoft.com/office/drawing/2014/main" id="{010DF240-920B-4843-8EE1-B4D1A8CFD219}"/>
               </a:ext>
             </a:extLst>
           </p:cNvPr>
@@ -14601,7 +14603,7 @@
           <p:cNvPr id="8" name="그림 7" descr="텍스트, 검은색이(가) 표시된 사진&#10;&#10;자동 생성된 설명">
             <a:extLst>
               <a:ext uri="{FF2B5EF4-FFF2-40B4-BE49-F238E27FC236}">
-                <a16:creationId xmlns:a16="http://schemas.microsoft.com/office/drawing/2014/main" xmlns="" id="{9AD66781-C55B-4DD2-9098-678F47A08EB6}"/>
+                <a16:creationId xmlns:a16="http://schemas.microsoft.com/office/drawing/2014/main" id="{9AD66781-C55B-4DD2-9098-678F47A08EB6}"/>
               </a:ext>
             </a:extLst>
           </p:cNvPr>
@@ -14614,7 +14616,7 @@
           <a:blip r:embed="rId3" cstate="print">
             <a:extLst>
               <a:ext uri="{28A0092B-C50C-407E-A947-70E740481C1C}">
-                <a14:useLocalDpi xmlns:a14="http://schemas.microsoft.com/office/drawing/2010/main" xmlns="" val="0"/>
+                <a14:useLocalDpi xmlns:a14="http://schemas.microsoft.com/office/drawing/2010/main" val="0"/>
               </a:ext>
             </a:extLst>
           </a:blip>
@@ -14635,7 +14637,7 @@
     </p:spTree>
     <p:extLst>
       <p:ext uri="{BB962C8B-B14F-4D97-AF65-F5344CB8AC3E}">
-        <p14:creationId xmlns:p14="http://schemas.microsoft.com/office/powerpoint/2010/main" xmlns="" val="2173481406"/>
+        <p14:creationId xmlns:p14="http://schemas.microsoft.com/office/powerpoint/2010/main" val="2173481406"/>
       </p:ext>
     </p:extLst>
   </p:cSld>
@@ -14934,7 +14936,7 @@
   <a:extraClrSchemeLst/>
   <a:extLst>
     <a:ext uri="{05A4C25C-085E-4340-85A3-A5531E510DB2}">
-      <thm15:themeFamily xmlns:thm15="http://schemas.microsoft.com/office/thememl/2012/main" xmlns="" name="Office Theme" id="{62F939B6-93AF-4DB8-9C6B-D6C7DFDC589F}" vid="{4A3C46E8-61CC-4603-A589-7422A47A8E4A}"/>
+      <thm15:themeFamily xmlns:thm15="http://schemas.microsoft.com/office/thememl/2012/main" name="Office Theme" id="{62F939B6-93AF-4DB8-9C6B-D6C7DFDC589F}" vid="{4A3C46E8-61CC-4603-A589-7422A47A8E4A}"/>
     </a:ext>
   </a:extLst>
 </a:theme>

</xml_diff>